<commit_message>
atualização do documento do trabalho, revisada após desenvolvimento do MVP.
</commit_message>
<xml_diff>
--- a/evidências/Desenho Arquitetura/Desenho Arquitetura.pptx
+++ b/evidências/Desenho Arquitetura/Desenho Arquitetura.pptx
@@ -104,6 +104,11 @@
       </a:defRPr>
     </a:lvl9pPr>
   </p:defaultTextStyle>
+  <p:extLst>
+    <p:ext uri="{EFAFB233-063F-42B5-8137-9DF3F51BA10A}">
+      <p15:sldGuideLst xmlns:p15="http://schemas.microsoft.com/office/powerpoint/2012/main"/>
+    </p:ext>
+  </p:extLst>
 </p:presentation>
 </file>
 
@@ -254,7 +259,7 @@
           <a:p>
             <a:fld id="{C5A5991F-B862-4D50-818F-E1A1CDCEBCB3}" type="datetimeFigureOut">
               <a:rPr lang="pt-BR" smtClean="0"/>
-              <a:t>28/07/2025</a:t>
+              <a:t>12/08/2025</a:t>
             </a:fld>
             <a:endParaRPr lang="pt-BR"/>
           </a:p>
@@ -452,7 +457,7 @@
           <a:p>
             <a:fld id="{C5A5991F-B862-4D50-818F-E1A1CDCEBCB3}" type="datetimeFigureOut">
               <a:rPr lang="pt-BR" smtClean="0"/>
-              <a:t>28/07/2025</a:t>
+              <a:t>12/08/2025</a:t>
             </a:fld>
             <a:endParaRPr lang="pt-BR"/>
           </a:p>
@@ -660,7 +665,7 @@
           <a:p>
             <a:fld id="{C5A5991F-B862-4D50-818F-E1A1CDCEBCB3}" type="datetimeFigureOut">
               <a:rPr lang="pt-BR" smtClean="0"/>
-              <a:t>28/07/2025</a:t>
+              <a:t>12/08/2025</a:t>
             </a:fld>
             <a:endParaRPr lang="pt-BR"/>
           </a:p>
@@ -858,7 +863,7 @@
           <a:p>
             <a:fld id="{C5A5991F-B862-4D50-818F-E1A1CDCEBCB3}" type="datetimeFigureOut">
               <a:rPr lang="pt-BR" smtClean="0"/>
-              <a:t>28/07/2025</a:t>
+              <a:t>12/08/2025</a:t>
             </a:fld>
             <a:endParaRPr lang="pt-BR"/>
           </a:p>
@@ -1133,7 +1138,7 @@
           <a:p>
             <a:fld id="{C5A5991F-B862-4D50-818F-E1A1CDCEBCB3}" type="datetimeFigureOut">
               <a:rPr lang="pt-BR" smtClean="0"/>
-              <a:t>28/07/2025</a:t>
+              <a:t>12/08/2025</a:t>
             </a:fld>
             <a:endParaRPr lang="pt-BR"/>
           </a:p>
@@ -1398,7 +1403,7 @@
           <a:p>
             <a:fld id="{C5A5991F-B862-4D50-818F-E1A1CDCEBCB3}" type="datetimeFigureOut">
               <a:rPr lang="pt-BR" smtClean="0"/>
-              <a:t>28/07/2025</a:t>
+              <a:t>12/08/2025</a:t>
             </a:fld>
             <a:endParaRPr lang="pt-BR"/>
           </a:p>
@@ -1810,7 +1815,7 @@
           <a:p>
             <a:fld id="{C5A5991F-B862-4D50-818F-E1A1CDCEBCB3}" type="datetimeFigureOut">
               <a:rPr lang="pt-BR" smtClean="0"/>
-              <a:t>28/07/2025</a:t>
+              <a:t>12/08/2025</a:t>
             </a:fld>
             <a:endParaRPr lang="pt-BR"/>
           </a:p>
@@ -1951,7 +1956,7 @@
           <a:p>
             <a:fld id="{C5A5991F-B862-4D50-818F-E1A1CDCEBCB3}" type="datetimeFigureOut">
               <a:rPr lang="pt-BR" smtClean="0"/>
-              <a:t>28/07/2025</a:t>
+              <a:t>12/08/2025</a:t>
             </a:fld>
             <a:endParaRPr lang="pt-BR"/>
           </a:p>
@@ -2064,7 +2069,7 @@
           <a:p>
             <a:fld id="{C5A5991F-B862-4D50-818F-E1A1CDCEBCB3}" type="datetimeFigureOut">
               <a:rPr lang="pt-BR" smtClean="0"/>
-              <a:t>28/07/2025</a:t>
+              <a:t>12/08/2025</a:t>
             </a:fld>
             <a:endParaRPr lang="pt-BR"/>
           </a:p>
@@ -2375,7 +2380,7 @@
           <a:p>
             <a:fld id="{C5A5991F-B862-4D50-818F-E1A1CDCEBCB3}" type="datetimeFigureOut">
               <a:rPr lang="pt-BR" smtClean="0"/>
-              <a:t>28/07/2025</a:t>
+              <a:t>12/08/2025</a:t>
             </a:fld>
             <a:endParaRPr lang="pt-BR"/>
           </a:p>
@@ -2663,7 +2668,7 @@
           <a:p>
             <a:fld id="{C5A5991F-B862-4D50-818F-E1A1CDCEBCB3}" type="datetimeFigureOut">
               <a:rPr lang="pt-BR" smtClean="0"/>
-              <a:t>28/07/2025</a:t>
+              <a:t>12/08/2025</a:t>
             </a:fld>
             <a:endParaRPr lang="pt-BR"/>
           </a:p>
@@ -2904,7 +2909,7 @@
           <a:p>
             <a:fld id="{C5A5991F-B862-4D50-818F-E1A1CDCEBCB3}" type="datetimeFigureOut">
               <a:rPr lang="pt-BR" smtClean="0"/>
-              <a:t>28/07/2025</a:t>
+              <a:t>12/08/2025</a:t>
             </a:fld>
             <a:endParaRPr lang="pt-BR"/>
           </a:p>
@@ -3933,7 +3938,7 @@
         </p:blipFill>
         <p:spPr>
           <a:xfrm>
-            <a:off x="6747421" y="2406271"/>
+            <a:off x="3399544" y="2412452"/>
             <a:ext cx="1344451" cy="533401"/>
           </a:xfrm>
           <a:prstGeom prst="rect">
@@ -3970,7 +3975,7 @@
         </p:blipFill>
         <p:spPr bwMode="auto">
           <a:xfrm>
-            <a:off x="3639095" y="3606421"/>
+            <a:off x="3497014" y="3606421"/>
             <a:ext cx="1104900" cy="806281"/>
           </a:xfrm>
           <a:prstGeom prst="rect">
@@ -4011,7 +4016,7 @@
         </p:blipFill>
         <p:spPr>
           <a:xfrm>
-            <a:off x="6747420" y="2882521"/>
+            <a:off x="3399543" y="2888702"/>
             <a:ext cx="1344451" cy="311150"/>
           </a:xfrm>
           <a:prstGeom prst="rect">
@@ -4048,7 +4053,7 @@
         </p:blipFill>
         <p:spPr bwMode="auto">
           <a:xfrm>
-            <a:off x="6902994" y="4819271"/>
+            <a:off x="3700293" y="4819271"/>
             <a:ext cx="742950" cy="742950"/>
           </a:xfrm>
           <a:prstGeom prst="rect">
@@ -4095,8 +4100,8 @@
         </p:blipFill>
         <p:spPr bwMode="auto">
           <a:xfrm>
-            <a:off x="3948658" y="1340823"/>
-            <a:ext cx="762878" cy="617773"/>
+            <a:off x="7222000" y="1435142"/>
+            <a:ext cx="477292" cy="386508"/>
           </a:xfrm>
           <a:prstGeom prst="rect">
             <a:avLst/>
@@ -4113,6 +4118,497 @@
           </a:extLst>
         </p:spPr>
       </p:pic>
+      <p:pic>
+        <p:nvPicPr>
+          <p:cNvPr id="1026" name="Picture 2" descr="Vercel Logo, symbol, meaning, history, PNG, brand">
+            <a:extLst>
+              <a:ext uri="{FF2B5EF4-FFF2-40B4-BE49-F238E27FC236}">
+                <a16:creationId xmlns:a16="http://schemas.microsoft.com/office/drawing/2014/main" id="{7F6C4FF0-CCCB-BC29-B97B-2006C78F8678}"/>
+              </a:ext>
+            </a:extLst>
+          </p:cNvPr>
+          <p:cNvPicPr>
+            <a:picLocks noChangeAspect="1" noChangeArrowheads="1"/>
+          </p:cNvPicPr>
+          <p:nvPr/>
+        </p:nvPicPr>
+        <p:blipFill>
+          <a:blip r:embed="rId6">
+            <a:extLst>
+              <a:ext uri="{28A0092B-C50C-407E-A947-70E740481C1C}">
+                <a14:useLocalDpi xmlns:a14="http://schemas.microsoft.com/office/drawing/2010/main" val="0"/>
+              </a:ext>
+            </a:extLst>
+          </a:blip>
+          <a:srcRect/>
+          <a:stretch>
+            <a:fillRect/>
+          </a:stretch>
+        </p:blipFill>
+        <p:spPr bwMode="auto">
+          <a:xfrm>
+            <a:off x="6879269" y="2488990"/>
+            <a:ext cx="1162755" cy="654050"/>
+          </a:xfrm>
+          <a:prstGeom prst="rect">
+            <a:avLst/>
+          </a:prstGeom>
+          <a:noFill/>
+          <a:extLst>
+            <a:ext uri="{909E8E84-426E-40DD-AFC4-6F175D3DCCD1}">
+              <a14:hiddenFill xmlns:a14="http://schemas.microsoft.com/office/drawing/2010/main">
+                <a:solidFill>
+                  <a:srgbClr val="FFFFFF"/>
+                </a:solidFill>
+              </a14:hiddenFill>
+            </a:ext>
+          </a:extLst>
+        </p:spPr>
+      </p:pic>
+      <p:sp>
+        <p:nvSpPr>
+          <p:cNvPr id="2" name="AutoShape 4" descr="Railway Design | Railway Design | Railway">
+            <a:extLst>
+              <a:ext uri="{FF2B5EF4-FFF2-40B4-BE49-F238E27FC236}">
+                <a16:creationId xmlns:a16="http://schemas.microsoft.com/office/drawing/2014/main" id="{3E1B6492-8741-0F09-B76E-998056F95BF8}"/>
+              </a:ext>
+            </a:extLst>
+          </p:cNvPr>
+          <p:cNvSpPr>
+            <a:spLocks noChangeAspect="1" noChangeArrowheads="1"/>
+          </p:cNvSpPr>
+          <p:nvPr/>
+        </p:nvSpPr>
+        <p:spPr bwMode="auto">
+          <a:xfrm>
+            <a:off x="5943600" y="3276600"/>
+            <a:ext cx="304800" cy="304800"/>
+          </a:xfrm>
+          <a:prstGeom prst="rect">
+            <a:avLst/>
+          </a:prstGeom>
+          <a:noFill/>
+          <a:extLst>
+            <a:ext uri="{909E8E84-426E-40DD-AFC4-6F175D3DCCD1}">
+              <a14:hiddenFill xmlns:a14="http://schemas.microsoft.com/office/drawing/2010/main">
+                <a:solidFill>
+                  <a:srgbClr val="FFFFFF"/>
+                </a:solidFill>
+              </a14:hiddenFill>
+            </a:ext>
+          </a:extLst>
+        </p:spPr>
+        <p:txBody>
+          <a:bodyPr vert="horz" wrap="square" lIns="91440" tIns="45720" rIns="91440" bIns="45720" numCol="1" anchor="t" anchorCtr="0" compatLnSpc="1">
+            <a:prstTxWarp prst="textNoShape">
+              <a:avLst/>
+            </a:prstTxWarp>
+          </a:bodyPr>
+          <a:lstStyle/>
+          <a:p>
+            <a:endParaRPr lang="pt-BR"/>
+          </a:p>
+        </p:txBody>
+      </p:sp>
+      <p:pic>
+        <p:nvPicPr>
+          <p:cNvPr id="1032" name="Picture 8" descr="Railway Design | Railway Design | Railway">
+            <a:extLst>
+              <a:ext uri="{FF2B5EF4-FFF2-40B4-BE49-F238E27FC236}">
+                <a16:creationId xmlns:a16="http://schemas.microsoft.com/office/drawing/2014/main" id="{A3BD04E2-B22D-67A9-C78B-6D5BB0A12122}"/>
+              </a:ext>
+            </a:extLst>
+          </p:cNvPr>
+          <p:cNvPicPr>
+            <a:picLocks noChangeAspect="1" noChangeArrowheads="1"/>
+          </p:cNvPicPr>
+          <p:nvPr/>
+        </p:nvPicPr>
+        <p:blipFill>
+          <a:blip r:embed="rId7">
+            <a:extLst>
+              <a:ext uri="{28A0092B-C50C-407E-A947-70E740481C1C}">
+                <a14:useLocalDpi xmlns:a14="http://schemas.microsoft.com/office/drawing/2010/main" val="0"/>
+              </a:ext>
+            </a:extLst>
+          </a:blip>
+          <a:srcRect/>
+          <a:stretch>
+            <a:fillRect/>
+          </a:stretch>
+        </p:blipFill>
+        <p:spPr bwMode="auto">
+          <a:xfrm>
+            <a:off x="6879269" y="3828290"/>
+            <a:ext cx="1162755" cy="319001"/>
+          </a:xfrm>
+          <a:prstGeom prst="rect">
+            <a:avLst/>
+          </a:prstGeom>
+          <a:noFill/>
+          <a:extLst>
+            <a:ext uri="{909E8E84-426E-40DD-AFC4-6F175D3DCCD1}">
+              <a14:hiddenFill xmlns:a14="http://schemas.microsoft.com/office/drawing/2010/main">
+                <a:solidFill>
+                  <a:srgbClr val="FFFFFF"/>
+                </a:solidFill>
+              </a14:hiddenFill>
+            </a:ext>
+          </a:extLst>
+        </p:spPr>
+      </p:pic>
+      <p:pic>
+        <p:nvPicPr>
+          <p:cNvPr id="4" name="Picture 8" descr="Railway Design | Railway Design | Railway">
+            <a:extLst>
+              <a:ext uri="{FF2B5EF4-FFF2-40B4-BE49-F238E27FC236}">
+                <a16:creationId xmlns:a16="http://schemas.microsoft.com/office/drawing/2014/main" id="{D9A6436B-0C7A-3AB9-2403-871F412BF89E}"/>
+              </a:ext>
+            </a:extLst>
+          </p:cNvPr>
+          <p:cNvPicPr>
+            <a:picLocks noChangeAspect="1" noChangeArrowheads="1"/>
+          </p:cNvPicPr>
+          <p:nvPr/>
+        </p:nvPicPr>
+        <p:blipFill>
+          <a:blip r:embed="rId7">
+            <a:extLst>
+              <a:ext uri="{28A0092B-C50C-407E-A947-70E740481C1C}">
+                <a14:useLocalDpi xmlns:a14="http://schemas.microsoft.com/office/drawing/2010/main" val="0"/>
+              </a:ext>
+            </a:extLst>
+          </a:blip>
+          <a:srcRect/>
+          <a:stretch>
+            <a:fillRect/>
+          </a:stretch>
+        </p:blipFill>
+        <p:spPr bwMode="auto">
+          <a:xfrm>
+            <a:off x="6885455" y="5031245"/>
+            <a:ext cx="1162755" cy="319001"/>
+          </a:xfrm>
+          <a:prstGeom prst="rect">
+            <a:avLst/>
+          </a:prstGeom>
+          <a:noFill/>
+          <a:extLst>
+            <a:ext uri="{909E8E84-426E-40DD-AFC4-6F175D3DCCD1}">
+              <a14:hiddenFill xmlns:a14="http://schemas.microsoft.com/office/drawing/2010/main">
+                <a:solidFill>
+                  <a:srgbClr val="FFFFFF"/>
+                </a:solidFill>
+              </a14:hiddenFill>
+            </a:ext>
+          </a:extLst>
+        </p:spPr>
+      </p:pic>
+      <p:sp>
+        <p:nvSpPr>
+          <p:cNvPr id="6" name="CaixaDeTexto 5">
+            <a:extLst>
+              <a:ext uri="{FF2B5EF4-FFF2-40B4-BE49-F238E27FC236}">
+                <a16:creationId xmlns:a16="http://schemas.microsoft.com/office/drawing/2014/main" id="{FEEA35D1-60C5-2890-48CA-C2448D7C9FE6}"/>
+              </a:ext>
+            </a:extLst>
+          </p:cNvPr>
+          <p:cNvSpPr txBox="1"/>
+          <p:nvPr/>
+        </p:nvSpPr>
+        <p:spPr>
+          <a:xfrm>
+            <a:off x="8420561" y="3740060"/>
+            <a:ext cx="1149517" cy="461665"/>
+          </a:xfrm>
+          <a:prstGeom prst="rect">
+            <a:avLst/>
+          </a:prstGeom>
+          <a:noFill/>
+        </p:spPr>
+        <p:txBody>
+          <a:bodyPr wrap="square">
+            <a:spAutoFit/>
+          </a:bodyPr>
+          <a:lstStyle/>
+          <a:p>
+            <a:pPr marL="0" marR="0" lvl="0" indent="0" algn="ctr" defTabSz="457200" eaLnBrk="1" fontAlgn="auto" latinLnBrk="0" hangingPunct="1">
+              <a:lnSpc>
+                <a:spcPct val="100000"/>
+              </a:lnSpc>
+              <a:spcBef>
+                <a:spcPts val="0"/>
+              </a:spcBef>
+              <a:spcAft>
+                <a:spcPts val="0"/>
+              </a:spcAft>
+              <a:buClrTx/>
+              <a:buSzTx/>
+              <a:buFontTx/>
+              <a:buNone/>
+              <a:tabLst/>
+              <a:defRPr/>
+            </a:pPr>
+            <a:r>
+              <a:rPr kumimoji="0" lang="pt-BR" sz="1200" b="0" i="0" u="none" strike="noStrike" kern="0" cap="none" spc="0" normalizeH="0" baseline="0" noProof="0" dirty="0">
+                <a:ln>
+                  <a:noFill/>
+                </a:ln>
+                <a:solidFill>
+                  <a:prstClr val="black"/>
+                </a:solidFill>
+                <a:effectLst/>
+                <a:uLnTx/>
+                <a:uFillTx/>
+                <a:latin typeface="Calibri"/>
+                <a:ea typeface="+mn-ea"/>
+                <a:cs typeface="+mn-cs"/>
+              </a:rPr>
+              <a:t>Cloud</a:t>
+            </a:r>
+            <a:br>
+              <a:rPr kumimoji="0" lang="pt-BR" sz="1200" b="0" i="0" u="none" strike="noStrike" kern="0" cap="none" spc="0" normalizeH="0" baseline="0" noProof="0" dirty="0">
+                <a:ln>
+                  <a:noFill/>
+                </a:ln>
+                <a:solidFill>
+                  <a:prstClr val="black"/>
+                </a:solidFill>
+                <a:effectLst/>
+                <a:uLnTx/>
+                <a:uFillTx/>
+                <a:latin typeface="Calibri"/>
+                <a:ea typeface="+mn-ea"/>
+                <a:cs typeface="+mn-cs"/>
+              </a:rPr>
+            </a:br>
+            <a:r>
+              <a:rPr kumimoji="0" lang="pt-BR" sz="1200" b="0" i="0" u="none" strike="noStrike" kern="0" cap="none" spc="0" normalizeH="0" baseline="0" noProof="0" dirty="0" err="1">
+                <a:ln>
+                  <a:noFill/>
+                </a:ln>
+                <a:solidFill>
+                  <a:prstClr val="black"/>
+                </a:solidFill>
+                <a:effectLst/>
+                <a:uLnTx/>
+                <a:uFillTx/>
+                <a:latin typeface="Calibri"/>
+                <a:ea typeface="+mn-ea"/>
+                <a:cs typeface="+mn-cs"/>
+              </a:rPr>
+              <a:t>Providers</a:t>
+            </a:r>
+            <a:endParaRPr kumimoji="0" lang="pt-BR" sz="1200" b="0" i="0" u="none" strike="noStrike" kern="0" cap="none" spc="0" normalizeH="0" baseline="0" noProof="0" dirty="0">
+              <a:ln>
+                <a:noFill/>
+              </a:ln>
+              <a:solidFill>
+                <a:prstClr val="black"/>
+              </a:solidFill>
+              <a:effectLst/>
+              <a:uLnTx/>
+              <a:uFillTx/>
+              <a:latin typeface="Calibri"/>
+              <a:ea typeface="+mn-ea"/>
+              <a:cs typeface="+mn-cs"/>
+            </a:endParaRPr>
+          </a:p>
+        </p:txBody>
+      </p:sp>
+      <p:sp>
+        <p:nvSpPr>
+          <p:cNvPr id="7" name="Chave Esquerda 6">
+            <a:extLst>
+              <a:ext uri="{FF2B5EF4-FFF2-40B4-BE49-F238E27FC236}">
+                <a16:creationId xmlns:a16="http://schemas.microsoft.com/office/drawing/2014/main" id="{3F244EED-06BE-3CE2-20DE-9421A2549477}"/>
+              </a:ext>
+            </a:extLst>
+          </p:cNvPr>
+          <p:cNvSpPr/>
+          <p:nvPr/>
+        </p:nvSpPr>
+        <p:spPr>
+          <a:xfrm rot="10800000">
+            <a:off x="8172286" y="2571750"/>
+            <a:ext cx="380997" cy="2798287"/>
+          </a:xfrm>
+          <a:prstGeom prst="leftBrace">
+            <a:avLst/>
+          </a:prstGeom>
+        </p:spPr>
+        <p:style>
+          <a:lnRef idx="2">
+            <a:schemeClr val="dk1"/>
+          </a:lnRef>
+          <a:fillRef idx="0">
+            <a:schemeClr val="dk1"/>
+          </a:fillRef>
+          <a:effectRef idx="1">
+            <a:schemeClr val="dk1"/>
+          </a:effectRef>
+          <a:fontRef idx="minor">
+            <a:schemeClr val="tx1"/>
+          </a:fontRef>
+        </p:style>
+        <p:txBody>
+          <a:bodyPr rtlCol="0" anchor="ctr"/>
+          <a:lstStyle/>
+          <a:p>
+            <a:pPr algn="ctr"/>
+            <a:endParaRPr lang="pt-BR"/>
+          </a:p>
+        </p:txBody>
+      </p:sp>
+      <p:sp>
+        <p:nvSpPr>
+          <p:cNvPr id="8" name="Chave Esquerda 7">
+            <a:extLst>
+              <a:ext uri="{FF2B5EF4-FFF2-40B4-BE49-F238E27FC236}">
+                <a16:creationId xmlns:a16="http://schemas.microsoft.com/office/drawing/2014/main" id="{BD172048-1C28-BAF3-9F4F-5BB97B004CB2}"/>
+              </a:ext>
+            </a:extLst>
+          </p:cNvPr>
+          <p:cNvSpPr/>
+          <p:nvPr/>
+        </p:nvSpPr>
+        <p:spPr>
+          <a:xfrm>
+            <a:off x="2974007" y="2399647"/>
+            <a:ext cx="380997" cy="2019848"/>
+          </a:xfrm>
+          <a:prstGeom prst="leftBrace">
+            <a:avLst/>
+          </a:prstGeom>
+        </p:spPr>
+        <p:style>
+          <a:lnRef idx="2">
+            <a:schemeClr val="dk1"/>
+          </a:lnRef>
+          <a:fillRef idx="0">
+            <a:schemeClr val="dk1"/>
+          </a:fillRef>
+          <a:effectRef idx="1">
+            <a:schemeClr val="dk1"/>
+          </a:effectRef>
+          <a:fontRef idx="minor">
+            <a:schemeClr val="tx1"/>
+          </a:fontRef>
+        </p:style>
+        <p:txBody>
+          <a:bodyPr rtlCol="0" anchor="ctr"/>
+          <a:lstStyle/>
+          <a:p>
+            <a:pPr algn="ctr"/>
+            <a:endParaRPr lang="pt-BR"/>
+          </a:p>
+        </p:txBody>
+      </p:sp>
+      <p:sp>
+        <p:nvSpPr>
+          <p:cNvPr id="9" name="CaixaDeTexto 8">
+            <a:extLst>
+              <a:ext uri="{FF2B5EF4-FFF2-40B4-BE49-F238E27FC236}">
+                <a16:creationId xmlns:a16="http://schemas.microsoft.com/office/drawing/2014/main" id="{EFDF6B0C-83E8-0BAF-0A96-305CD50D3975}"/>
+              </a:ext>
+            </a:extLst>
+          </p:cNvPr>
+          <p:cNvSpPr txBox="1"/>
+          <p:nvPr/>
+        </p:nvSpPr>
+        <p:spPr>
+          <a:xfrm>
+            <a:off x="1840446" y="3178738"/>
+            <a:ext cx="1149517" cy="461665"/>
+          </a:xfrm>
+          <a:prstGeom prst="rect">
+            <a:avLst/>
+          </a:prstGeom>
+          <a:noFill/>
+        </p:spPr>
+        <p:txBody>
+          <a:bodyPr wrap="square">
+            <a:spAutoFit/>
+          </a:bodyPr>
+          <a:lstStyle/>
+          <a:p>
+            <a:pPr marL="0" marR="0" lvl="0" indent="0" algn="ctr" defTabSz="457200" eaLnBrk="1" fontAlgn="auto" latinLnBrk="0" hangingPunct="1">
+              <a:lnSpc>
+                <a:spcPct val="100000"/>
+              </a:lnSpc>
+              <a:spcBef>
+                <a:spcPts val="0"/>
+              </a:spcBef>
+              <a:spcAft>
+                <a:spcPts val="0"/>
+              </a:spcAft>
+              <a:buClrTx/>
+              <a:buSzTx/>
+              <a:buFontTx/>
+              <a:buNone/>
+              <a:tabLst/>
+              <a:defRPr/>
+            </a:pPr>
+            <a:r>
+              <a:rPr lang="pt-BR" sz="1200" kern="0" dirty="0" err="1">
+                <a:solidFill>
+                  <a:prstClr val="black"/>
+                </a:solidFill>
+                <a:latin typeface="Calibri"/>
+              </a:rPr>
+              <a:t>Development</a:t>
+            </a:r>
+            <a:endParaRPr lang="pt-BR" sz="1200" kern="0" dirty="0">
+              <a:solidFill>
+                <a:prstClr val="black"/>
+              </a:solidFill>
+              <a:latin typeface="Calibri"/>
+            </a:endParaRPr>
+          </a:p>
+          <a:p>
+            <a:pPr marL="0" marR="0" lvl="0" indent="0" algn="ctr" defTabSz="457200" eaLnBrk="1" fontAlgn="auto" latinLnBrk="0" hangingPunct="1">
+              <a:lnSpc>
+                <a:spcPct val="100000"/>
+              </a:lnSpc>
+              <a:spcBef>
+                <a:spcPts val="0"/>
+              </a:spcBef>
+              <a:spcAft>
+                <a:spcPts val="0"/>
+              </a:spcAft>
+              <a:buClrTx/>
+              <a:buSzTx/>
+              <a:buFontTx/>
+              <a:buNone/>
+              <a:tabLst/>
+              <a:defRPr/>
+            </a:pPr>
+            <a:r>
+              <a:rPr lang="pt-BR" sz="1200" kern="0" dirty="0">
+                <a:solidFill>
+                  <a:prstClr val="black"/>
+                </a:solidFill>
+                <a:latin typeface="Calibri"/>
+              </a:rPr>
+              <a:t>Frameworks</a:t>
+            </a:r>
+            <a:endParaRPr kumimoji="0" lang="pt-BR" sz="1200" b="0" i="0" u="none" strike="noStrike" kern="0" cap="none" spc="0" normalizeH="0" baseline="0" noProof="0" dirty="0">
+              <a:ln>
+                <a:noFill/>
+              </a:ln>
+              <a:solidFill>
+                <a:prstClr val="black"/>
+              </a:solidFill>
+              <a:effectLst/>
+              <a:uLnTx/>
+              <a:uFillTx/>
+              <a:latin typeface="Calibri"/>
+              <a:ea typeface="+mn-ea"/>
+              <a:cs typeface="+mn-cs"/>
+            </a:endParaRPr>
+          </a:p>
+        </p:txBody>
+      </p:sp>
     </p:spTree>
     <p:extLst>
       <p:ext uri="{BB962C8B-B14F-4D97-AF65-F5344CB8AC3E}">

</xml_diff>

<commit_message>
revisões TCC solicitadas pelo professor Júlio Machado
</commit_message>
<xml_diff>
--- a/evidências/Desenho Arquitetura/Desenho Arquitetura.pptx
+++ b/evidências/Desenho Arquitetura/Desenho Arquitetura.pptx
@@ -6,6 +6,7 @@
   </p:sldMasterIdLst>
   <p:sldIdLst>
     <p:sldId id="256" r:id="rId2"/>
+    <p:sldId id="257" r:id="rId3"/>
   </p:sldIdLst>
   <p:sldSz cx="12192000" cy="6858000"/>
   <p:notesSz cx="6858000" cy="9144000"/>
@@ -259,7 +260,7 @@
           <a:p>
             <a:fld id="{C5A5991F-B862-4D50-818F-E1A1CDCEBCB3}" type="datetimeFigureOut">
               <a:rPr lang="pt-BR" smtClean="0"/>
-              <a:t>12/08/2025</a:t>
+              <a:t>22/09/2025</a:t>
             </a:fld>
             <a:endParaRPr lang="pt-BR"/>
           </a:p>
@@ -457,7 +458,7 @@
           <a:p>
             <a:fld id="{C5A5991F-B862-4D50-818F-E1A1CDCEBCB3}" type="datetimeFigureOut">
               <a:rPr lang="pt-BR" smtClean="0"/>
-              <a:t>12/08/2025</a:t>
+              <a:t>22/09/2025</a:t>
             </a:fld>
             <a:endParaRPr lang="pt-BR"/>
           </a:p>
@@ -665,7 +666,7 @@
           <a:p>
             <a:fld id="{C5A5991F-B862-4D50-818F-E1A1CDCEBCB3}" type="datetimeFigureOut">
               <a:rPr lang="pt-BR" smtClean="0"/>
-              <a:t>12/08/2025</a:t>
+              <a:t>22/09/2025</a:t>
             </a:fld>
             <a:endParaRPr lang="pt-BR"/>
           </a:p>
@@ -863,7 +864,7 @@
           <a:p>
             <a:fld id="{C5A5991F-B862-4D50-818F-E1A1CDCEBCB3}" type="datetimeFigureOut">
               <a:rPr lang="pt-BR" smtClean="0"/>
-              <a:t>12/08/2025</a:t>
+              <a:t>22/09/2025</a:t>
             </a:fld>
             <a:endParaRPr lang="pt-BR"/>
           </a:p>
@@ -1138,7 +1139,7 @@
           <a:p>
             <a:fld id="{C5A5991F-B862-4D50-818F-E1A1CDCEBCB3}" type="datetimeFigureOut">
               <a:rPr lang="pt-BR" smtClean="0"/>
-              <a:t>12/08/2025</a:t>
+              <a:t>22/09/2025</a:t>
             </a:fld>
             <a:endParaRPr lang="pt-BR"/>
           </a:p>
@@ -1403,7 +1404,7 @@
           <a:p>
             <a:fld id="{C5A5991F-B862-4D50-818F-E1A1CDCEBCB3}" type="datetimeFigureOut">
               <a:rPr lang="pt-BR" smtClean="0"/>
-              <a:t>12/08/2025</a:t>
+              <a:t>22/09/2025</a:t>
             </a:fld>
             <a:endParaRPr lang="pt-BR"/>
           </a:p>
@@ -1815,7 +1816,7 @@
           <a:p>
             <a:fld id="{C5A5991F-B862-4D50-818F-E1A1CDCEBCB3}" type="datetimeFigureOut">
               <a:rPr lang="pt-BR" smtClean="0"/>
-              <a:t>12/08/2025</a:t>
+              <a:t>22/09/2025</a:t>
             </a:fld>
             <a:endParaRPr lang="pt-BR"/>
           </a:p>
@@ -1956,7 +1957,7 @@
           <a:p>
             <a:fld id="{C5A5991F-B862-4D50-818F-E1A1CDCEBCB3}" type="datetimeFigureOut">
               <a:rPr lang="pt-BR" smtClean="0"/>
-              <a:t>12/08/2025</a:t>
+              <a:t>22/09/2025</a:t>
             </a:fld>
             <a:endParaRPr lang="pt-BR"/>
           </a:p>
@@ -2069,7 +2070,7 @@
           <a:p>
             <a:fld id="{C5A5991F-B862-4D50-818F-E1A1CDCEBCB3}" type="datetimeFigureOut">
               <a:rPr lang="pt-BR" smtClean="0"/>
-              <a:t>12/08/2025</a:t>
+              <a:t>22/09/2025</a:t>
             </a:fld>
             <a:endParaRPr lang="pt-BR"/>
           </a:p>
@@ -2380,7 +2381,7 @@
           <a:p>
             <a:fld id="{C5A5991F-B862-4D50-818F-E1A1CDCEBCB3}" type="datetimeFigureOut">
               <a:rPr lang="pt-BR" smtClean="0"/>
-              <a:t>12/08/2025</a:t>
+              <a:t>22/09/2025</a:t>
             </a:fld>
             <a:endParaRPr lang="pt-BR"/>
           </a:p>
@@ -2668,7 +2669,7 @@
           <a:p>
             <a:fld id="{C5A5991F-B862-4D50-818F-E1A1CDCEBCB3}" type="datetimeFigureOut">
               <a:rPr lang="pt-BR" smtClean="0"/>
-              <a:t>12/08/2025</a:t>
+              <a:t>22/09/2025</a:t>
             </a:fld>
             <a:endParaRPr lang="pt-BR"/>
           </a:p>
@@ -2909,7 +2910,7 @@
           <a:p>
             <a:fld id="{C5A5991F-B862-4D50-818F-E1A1CDCEBCB3}" type="datetimeFigureOut">
               <a:rPr lang="pt-BR" smtClean="0"/>
-              <a:t>12/08/2025</a:t>
+              <a:t>22/09/2025</a:t>
             </a:fld>
             <a:endParaRPr lang="pt-BR"/>
           </a:p>
@@ -4613,6 +4614,1669 @@
     <p:extLst>
       <p:ext uri="{BB962C8B-B14F-4D97-AF65-F5344CB8AC3E}">
         <p14:creationId xmlns:p14="http://schemas.microsoft.com/office/powerpoint/2010/main" val="1553610823"/>
+      </p:ext>
+    </p:extLst>
+  </p:cSld>
+  <p:clrMapOvr>
+    <a:masterClrMapping/>
+  </p:clrMapOvr>
+</p:sld>
+</file>
+
+<file path=ppt/slides/slide2.xml><?xml version="1.0" encoding="utf-8"?>
+<p:sld xmlns:a="http://schemas.openxmlformats.org/drawingml/2006/main" xmlns:r="http://schemas.openxmlformats.org/officeDocument/2006/relationships" xmlns:p="http://schemas.openxmlformats.org/presentationml/2006/main">
+  <p:cSld>
+    <p:spTree>
+      <p:nvGrpSpPr>
+        <p:cNvPr id="1" name="">
+          <a:extLst>
+            <a:ext uri="{FF2B5EF4-FFF2-40B4-BE49-F238E27FC236}">
+              <a16:creationId xmlns:a16="http://schemas.microsoft.com/office/drawing/2014/main" id="{C8E2AAF5-B020-94BE-835C-326FE8AF2EAE}"/>
+            </a:ext>
+          </a:extLst>
+        </p:cNvPr>
+        <p:cNvGrpSpPr/>
+        <p:nvPr/>
+      </p:nvGrpSpPr>
+      <p:grpSpPr>
+        <a:xfrm>
+          <a:off x="0" y="0"/>
+          <a:ext cx="0" cy="0"/>
+          <a:chOff x="0" y="0"/>
+          <a:chExt cx="0" cy="0"/>
+        </a:xfrm>
+      </p:grpSpPr>
+      <p:sp>
+        <p:nvSpPr>
+          <p:cNvPr id="16" name="Retângulo: Cantos Arredondados 15">
+            <a:extLst>
+              <a:ext uri="{FF2B5EF4-FFF2-40B4-BE49-F238E27FC236}">
+                <a16:creationId xmlns:a16="http://schemas.microsoft.com/office/drawing/2014/main" id="{ED554034-3A0A-DADE-D843-16387C0F68EC}"/>
+              </a:ext>
+            </a:extLst>
+          </p:cNvPr>
+          <p:cNvSpPr/>
+          <p:nvPr/>
+        </p:nvSpPr>
+        <p:spPr>
+          <a:xfrm>
+            <a:off x="1126082" y="1374122"/>
+            <a:ext cx="1797050" cy="654050"/>
+          </a:xfrm>
+          <a:prstGeom prst="roundRect">
+            <a:avLst/>
+          </a:prstGeom>
+          <a:solidFill>
+            <a:srgbClr val="F79646">
+              <a:lumMod val="40000"/>
+              <a:lumOff val="60000"/>
+            </a:srgbClr>
+          </a:solidFill>
+          <a:ln>
+            <a:noFill/>
+          </a:ln>
+          <a:effectLst/>
+        </p:spPr>
+        <p:txBody>
+          <a:bodyPr rtlCol="0" anchor="ctr"/>
+          <a:lstStyle/>
+          <a:p>
+            <a:pPr marL="0" marR="0" lvl="0" indent="0" algn="ctr" defTabSz="457200" eaLnBrk="1" fontAlgn="auto" latinLnBrk="0" hangingPunct="1">
+              <a:lnSpc>
+                <a:spcPct val="100000"/>
+              </a:lnSpc>
+              <a:spcBef>
+                <a:spcPts val="0"/>
+              </a:spcBef>
+              <a:spcAft>
+                <a:spcPts val="0"/>
+              </a:spcAft>
+              <a:buClrTx/>
+              <a:buSzTx/>
+              <a:buFontTx/>
+              <a:buNone/>
+              <a:tabLst/>
+              <a:defRPr/>
+            </a:pPr>
+            <a:r>
+              <a:rPr kumimoji="0" lang="pt-BR" sz="1600" b="0" i="0" u="none" strike="noStrike" kern="0" cap="none" spc="0" normalizeH="0" baseline="0" noProof="0" dirty="0">
+                <a:ln>
+                  <a:noFill/>
+                </a:ln>
+                <a:solidFill>
+                  <a:prstClr val="black"/>
+                </a:solidFill>
+                <a:effectLst/>
+                <a:uLnTx/>
+                <a:uFillTx/>
+                <a:latin typeface="Calibri"/>
+                <a:ea typeface="+mn-ea"/>
+                <a:cs typeface="+mn-cs"/>
+              </a:rPr>
+              <a:t>Usuário Final</a:t>
+            </a:r>
+          </a:p>
+          <a:p>
+            <a:pPr marL="0" marR="0" lvl="0" indent="0" algn="ctr" defTabSz="457200" eaLnBrk="1" fontAlgn="auto" latinLnBrk="0" hangingPunct="1">
+              <a:lnSpc>
+                <a:spcPct val="100000"/>
+              </a:lnSpc>
+              <a:spcBef>
+                <a:spcPts val="0"/>
+              </a:spcBef>
+              <a:spcAft>
+                <a:spcPts val="0"/>
+              </a:spcAft>
+              <a:buClrTx/>
+              <a:buSzTx/>
+              <a:buFontTx/>
+              <a:buNone/>
+              <a:tabLst/>
+              <a:defRPr/>
+            </a:pPr>
+            <a:r>
+              <a:rPr kumimoji="0" lang="pt-BR" sz="1600" b="0" i="0" u="none" strike="noStrike" kern="0" cap="none" spc="0" normalizeH="0" baseline="0" noProof="0" dirty="0">
+                <a:ln>
+                  <a:noFill/>
+                </a:ln>
+                <a:solidFill>
+                  <a:srgbClr val="F79646">
+                    <a:lumMod val="75000"/>
+                  </a:srgbClr>
+                </a:solidFill>
+                <a:effectLst/>
+                <a:uLnTx/>
+                <a:uFillTx/>
+                <a:latin typeface="Calibri"/>
+                <a:ea typeface="+mn-ea"/>
+                <a:cs typeface="+mn-cs"/>
+              </a:rPr>
+              <a:t>Navegador web</a:t>
+            </a:r>
+          </a:p>
+        </p:txBody>
+      </p:sp>
+      <p:sp>
+        <p:nvSpPr>
+          <p:cNvPr id="17" name="Retângulo: Cantos Arredondados 16">
+            <a:extLst>
+              <a:ext uri="{FF2B5EF4-FFF2-40B4-BE49-F238E27FC236}">
+                <a16:creationId xmlns:a16="http://schemas.microsoft.com/office/drawing/2014/main" id="{CF883663-0141-6921-23B7-42C5A149242E}"/>
+              </a:ext>
+            </a:extLst>
+          </p:cNvPr>
+          <p:cNvSpPr/>
+          <p:nvPr/>
+        </p:nvSpPr>
+        <p:spPr>
+          <a:xfrm>
+            <a:off x="1126082" y="2561572"/>
+            <a:ext cx="1797050" cy="654050"/>
+          </a:xfrm>
+          <a:prstGeom prst="roundRect">
+            <a:avLst/>
+          </a:prstGeom>
+          <a:solidFill>
+            <a:schemeClr val="accent4">
+              <a:lumMod val="20000"/>
+              <a:lumOff val="80000"/>
+            </a:schemeClr>
+          </a:solidFill>
+          <a:ln>
+            <a:noFill/>
+          </a:ln>
+          <a:effectLst/>
+        </p:spPr>
+        <p:txBody>
+          <a:bodyPr rtlCol="0" anchor="ctr"/>
+          <a:lstStyle/>
+          <a:p>
+            <a:pPr marL="0" marR="0" lvl="0" indent="0" algn="ctr" defTabSz="457200" eaLnBrk="1" fontAlgn="auto" latinLnBrk="0" hangingPunct="1">
+              <a:lnSpc>
+                <a:spcPct val="100000"/>
+              </a:lnSpc>
+              <a:spcBef>
+                <a:spcPts val="0"/>
+              </a:spcBef>
+              <a:spcAft>
+                <a:spcPts val="0"/>
+              </a:spcAft>
+              <a:buClrTx/>
+              <a:buSzTx/>
+              <a:buFontTx/>
+              <a:buNone/>
+              <a:tabLst/>
+              <a:defRPr/>
+            </a:pPr>
+            <a:r>
+              <a:rPr lang="pt-BR" sz="1600" kern="0" dirty="0">
+                <a:solidFill>
+                  <a:prstClr val="black"/>
+                </a:solidFill>
+                <a:latin typeface="Calibri"/>
+              </a:rPr>
+              <a:t>Pingou</a:t>
+            </a:r>
+            <a:endParaRPr kumimoji="0" lang="pt-BR" sz="1600" b="0" i="0" u="none" strike="noStrike" kern="0" cap="none" spc="0" normalizeH="0" baseline="0" noProof="0" dirty="0">
+              <a:ln>
+                <a:noFill/>
+              </a:ln>
+              <a:solidFill>
+                <a:prstClr val="black"/>
+              </a:solidFill>
+              <a:effectLst/>
+              <a:uLnTx/>
+              <a:uFillTx/>
+              <a:latin typeface="Calibri"/>
+              <a:ea typeface="+mn-ea"/>
+              <a:cs typeface="+mn-cs"/>
+            </a:endParaRPr>
+          </a:p>
+          <a:p>
+            <a:pPr marL="0" marR="0" lvl="0" indent="0" algn="ctr" defTabSz="457200" eaLnBrk="1" fontAlgn="auto" latinLnBrk="0" hangingPunct="1">
+              <a:lnSpc>
+                <a:spcPct val="100000"/>
+              </a:lnSpc>
+              <a:spcBef>
+                <a:spcPts val="0"/>
+              </a:spcBef>
+              <a:spcAft>
+                <a:spcPts val="0"/>
+              </a:spcAft>
+              <a:buClrTx/>
+              <a:buSzTx/>
+              <a:buFontTx/>
+              <a:buNone/>
+              <a:tabLst/>
+              <a:defRPr/>
+            </a:pPr>
+            <a:r>
+              <a:rPr kumimoji="0" lang="pt-BR" sz="1600" b="0" i="0" u="none" strike="noStrike" kern="0" cap="none" spc="0" normalizeH="0" baseline="0" noProof="0" dirty="0">
+                <a:ln>
+                  <a:noFill/>
+                </a:ln>
+                <a:solidFill>
+                  <a:srgbClr val="002060"/>
+                </a:solidFill>
+                <a:effectLst/>
+                <a:uLnTx/>
+                <a:uFillTx/>
+                <a:latin typeface="Calibri"/>
+                <a:ea typeface="+mn-ea"/>
+                <a:cs typeface="+mn-cs"/>
+              </a:rPr>
+              <a:t>Web Site</a:t>
+            </a:r>
+          </a:p>
+        </p:txBody>
+      </p:sp>
+      <p:cxnSp>
+        <p:nvCxnSpPr>
+          <p:cNvPr id="20" name="Conector de Seta Reta 19">
+            <a:extLst>
+              <a:ext uri="{FF2B5EF4-FFF2-40B4-BE49-F238E27FC236}">
+                <a16:creationId xmlns:a16="http://schemas.microsoft.com/office/drawing/2014/main" id="{A19F2181-99BB-A672-C5A0-C42DD8FA6ACA}"/>
+              </a:ext>
+            </a:extLst>
+          </p:cNvPr>
+          <p:cNvCxnSpPr>
+            <a:stCxn id="16" idx="2"/>
+            <a:endCxn id="17" idx="0"/>
+          </p:cNvCxnSpPr>
+          <p:nvPr/>
+        </p:nvCxnSpPr>
+        <p:spPr>
+          <a:xfrm>
+            <a:off x="2024607" y="2028172"/>
+            <a:ext cx="0" cy="533400"/>
+          </a:xfrm>
+          <a:prstGeom prst="straightConnector1">
+            <a:avLst/>
+          </a:prstGeom>
+          <a:noFill/>
+          <a:ln w="19050" cap="flat" cmpd="sng" algn="ctr">
+            <a:solidFill>
+              <a:sysClr val="windowText" lastClr="000000"/>
+            </a:solidFill>
+            <a:prstDash val="solid"/>
+            <a:round/>
+            <a:headEnd type="none" w="med" len="med"/>
+            <a:tailEnd type="arrow" w="med" len="med"/>
+          </a:ln>
+          <a:effectLst/>
+        </p:spPr>
+      </p:cxnSp>
+      <p:sp>
+        <p:nvSpPr>
+          <p:cNvPr id="2" name="AutoShape 4" descr="Railway Design | Railway Design | Railway">
+            <a:extLst>
+              <a:ext uri="{FF2B5EF4-FFF2-40B4-BE49-F238E27FC236}">
+                <a16:creationId xmlns:a16="http://schemas.microsoft.com/office/drawing/2014/main" id="{8CE538B1-85BD-34B4-5EFF-6E9C0753C8D6}"/>
+              </a:ext>
+            </a:extLst>
+          </p:cNvPr>
+          <p:cNvSpPr>
+            <a:spLocks noChangeAspect="1" noChangeArrowheads="1"/>
+          </p:cNvSpPr>
+          <p:nvPr/>
+        </p:nvSpPr>
+        <p:spPr bwMode="auto">
+          <a:xfrm>
+            <a:off x="2127250" y="2844800"/>
+            <a:ext cx="304800" cy="304800"/>
+          </a:xfrm>
+          <a:prstGeom prst="rect">
+            <a:avLst/>
+          </a:prstGeom>
+          <a:noFill/>
+          <a:extLst>
+            <a:ext uri="{909E8E84-426E-40DD-AFC4-6F175D3DCCD1}">
+              <a14:hiddenFill xmlns:a14="http://schemas.microsoft.com/office/drawing/2010/main">
+                <a:solidFill>
+                  <a:srgbClr val="FFFFFF"/>
+                </a:solidFill>
+              </a14:hiddenFill>
+            </a:ext>
+          </a:extLst>
+        </p:spPr>
+        <p:txBody>
+          <a:bodyPr vert="horz" wrap="square" lIns="91440" tIns="45720" rIns="91440" bIns="45720" numCol="1" anchor="t" anchorCtr="0" compatLnSpc="1">
+            <a:prstTxWarp prst="textNoShape">
+              <a:avLst/>
+            </a:prstTxWarp>
+          </a:bodyPr>
+          <a:lstStyle/>
+          <a:p>
+            <a:endParaRPr lang="pt-BR"/>
+          </a:p>
+        </p:txBody>
+      </p:sp>
+      <p:sp>
+        <p:nvSpPr>
+          <p:cNvPr id="5" name="CaixaDeTexto 4">
+            <a:extLst>
+              <a:ext uri="{FF2B5EF4-FFF2-40B4-BE49-F238E27FC236}">
+                <a16:creationId xmlns:a16="http://schemas.microsoft.com/office/drawing/2014/main" id="{3D00B3B4-317E-C693-F240-2C7F6BC347E4}"/>
+              </a:ext>
+            </a:extLst>
+          </p:cNvPr>
+          <p:cNvSpPr txBox="1"/>
+          <p:nvPr/>
+        </p:nvSpPr>
+        <p:spPr>
+          <a:xfrm>
+            <a:off x="152400" y="171997"/>
+            <a:ext cx="6096000" cy="369332"/>
+          </a:xfrm>
+          <a:prstGeom prst="rect">
+            <a:avLst/>
+          </a:prstGeom>
+          <a:noFill/>
+        </p:spPr>
+        <p:txBody>
+          <a:bodyPr wrap="square">
+            <a:spAutoFit/>
+          </a:bodyPr>
+          <a:lstStyle/>
+          <a:p>
+            <a:r>
+              <a:rPr lang="pt-BR" dirty="0"/>
+              <a:t>Diagrama C4</a:t>
+            </a:r>
+          </a:p>
+        </p:txBody>
+      </p:sp>
+      <p:sp>
+        <p:nvSpPr>
+          <p:cNvPr id="11" name="Chave Esquerda 10">
+            <a:extLst>
+              <a:ext uri="{FF2B5EF4-FFF2-40B4-BE49-F238E27FC236}">
+                <a16:creationId xmlns:a16="http://schemas.microsoft.com/office/drawing/2014/main" id="{B9787F02-9ACC-13A6-300F-9455CC64B921}"/>
+              </a:ext>
+            </a:extLst>
+          </p:cNvPr>
+          <p:cNvSpPr/>
+          <p:nvPr/>
+        </p:nvSpPr>
+        <p:spPr>
+          <a:xfrm>
+            <a:off x="3200400" y="927235"/>
+            <a:ext cx="380997" cy="3949565"/>
+          </a:xfrm>
+          <a:prstGeom prst="leftBrace">
+            <a:avLst/>
+          </a:prstGeom>
+        </p:spPr>
+        <p:style>
+          <a:lnRef idx="2">
+            <a:schemeClr val="dk1"/>
+          </a:lnRef>
+          <a:fillRef idx="0">
+            <a:schemeClr val="dk1"/>
+          </a:fillRef>
+          <a:effectRef idx="1">
+            <a:schemeClr val="dk1"/>
+          </a:effectRef>
+          <a:fontRef idx="minor">
+            <a:schemeClr val="tx1"/>
+          </a:fontRef>
+        </p:style>
+        <p:txBody>
+          <a:bodyPr rtlCol="0" anchor="ctr"/>
+          <a:lstStyle/>
+          <a:p>
+            <a:pPr algn="ctr"/>
+            <a:endParaRPr lang="pt-BR"/>
+          </a:p>
+        </p:txBody>
+      </p:sp>
+      <p:sp>
+        <p:nvSpPr>
+          <p:cNvPr id="12" name="Retângulo: Cantos Arredondados 11">
+            <a:extLst>
+              <a:ext uri="{FF2B5EF4-FFF2-40B4-BE49-F238E27FC236}">
+                <a16:creationId xmlns:a16="http://schemas.microsoft.com/office/drawing/2014/main" id="{8BCF4388-EBF9-CF4D-6799-7E5D9A2BF8BF}"/>
+              </a:ext>
+            </a:extLst>
+          </p:cNvPr>
+          <p:cNvSpPr/>
+          <p:nvPr/>
+        </p:nvSpPr>
+        <p:spPr>
+          <a:xfrm>
+            <a:off x="3953915" y="927236"/>
+            <a:ext cx="1797050" cy="654050"/>
+          </a:xfrm>
+          <a:prstGeom prst="roundRect">
+            <a:avLst/>
+          </a:prstGeom>
+          <a:solidFill>
+            <a:srgbClr val="C0504D">
+              <a:lumMod val="40000"/>
+              <a:lumOff val="60000"/>
+            </a:srgbClr>
+          </a:solidFill>
+          <a:ln>
+            <a:noFill/>
+          </a:ln>
+          <a:effectLst/>
+        </p:spPr>
+        <p:txBody>
+          <a:bodyPr rtlCol="0" anchor="ctr"/>
+          <a:lstStyle/>
+          <a:p>
+            <a:pPr marL="0" marR="0" lvl="0" indent="0" algn="ctr" defTabSz="457200" eaLnBrk="1" fontAlgn="auto" latinLnBrk="0" hangingPunct="1">
+              <a:lnSpc>
+                <a:spcPct val="100000"/>
+              </a:lnSpc>
+              <a:spcBef>
+                <a:spcPts val="0"/>
+              </a:spcBef>
+              <a:spcAft>
+                <a:spcPts val="0"/>
+              </a:spcAft>
+              <a:buClrTx/>
+              <a:buSzTx/>
+              <a:buFontTx/>
+              <a:buNone/>
+              <a:tabLst/>
+              <a:defRPr/>
+            </a:pPr>
+            <a:r>
+              <a:rPr kumimoji="0" lang="pt-BR" sz="1600" b="0" i="0" u="none" strike="noStrike" kern="0" cap="none" spc="0" normalizeH="0" baseline="0" noProof="0" dirty="0" err="1">
+                <a:ln>
+                  <a:noFill/>
+                </a:ln>
+                <a:solidFill>
+                  <a:prstClr val="black"/>
+                </a:solidFill>
+                <a:effectLst/>
+                <a:uLnTx/>
+                <a:uFillTx/>
+                <a:latin typeface="Calibri"/>
+                <a:ea typeface="+mn-ea"/>
+                <a:cs typeface="+mn-cs"/>
+              </a:rPr>
+              <a:t>Frontend</a:t>
+            </a:r>
+            <a:endParaRPr kumimoji="0" lang="pt-BR" sz="1600" b="0" i="0" u="none" strike="noStrike" kern="0" cap="none" spc="0" normalizeH="0" baseline="0" noProof="0" dirty="0">
+              <a:ln>
+                <a:noFill/>
+              </a:ln>
+              <a:solidFill>
+                <a:prstClr val="black"/>
+              </a:solidFill>
+              <a:effectLst/>
+              <a:uLnTx/>
+              <a:uFillTx/>
+              <a:latin typeface="Calibri"/>
+              <a:ea typeface="+mn-ea"/>
+              <a:cs typeface="+mn-cs"/>
+            </a:endParaRPr>
+          </a:p>
+          <a:p>
+            <a:pPr marL="0" marR="0" lvl="0" indent="0" algn="ctr" defTabSz="457200" eaLnBrk="1" fontAlgn="auto" latinLnBrk="0" hangingPunct="1">
+              <a:lnSpc>
+                <a:spcPct val="100000"/>
+              </a:lnSpc>
+              <a:spcBef>
+                <a:spcPts val="0"/>
+              </a:spcBef>
+              <a:spcAft>
+                <a:spcPts val="0"/>
+              </a:spcAft>
+              <a:buClrTx/>
+              <a:buSzTx/>
+              <a:buFontTx/>
+              <a:buNone/>
+              <a:tabLst/>
+              <a:defRPr/>
+            </a:pPr>
+            <a:r>
+              <a:rPr kumimoji="0" lang="pt-BR" sz="1600" b="0" i="0" u="none" strike="noStrike" kern="0" cap="none" spc="0" normalizeH="0" baseline="0" noProof="0" dirty="0" err="1">
+                <a:ln>
+                  <a:noFill/>
+                </a:ln>
+                <a:solidFill>
+                  <a:srgbClr val="FF0000"/>
+                </a:solidFill>
+                <a:effectLst/>
+                <a:uLnTx/>
+                <a:uFillTx/>
+                <a:latin typeface="Calibri"/>
+                <a:ea typeface="+mn-ea"/>
+                <a:cs typeface="+mn-cs"/>
+              </a:rPr>
+              <a:t>React</a:t>
+            </a:r>
+            <a:r>
+              <a:rPr kumimoji="0" lang="pt-BR" sz="1600" b="0" i="0" u="none" strike="noStrike" kern="0" cap="none" spc="0" normalizeH="0" baseline="0" noProof="0" dirty="0">
+                <a:ln>
+                  <a:noFill/>
+                </a:ln>
+                <a:solidFill>
+                  <a:srgbClr val="FF0000"/>
+                </a:solidFill>
+                <a:effectLst/>
+                <a:uLnTx/>
+                <a:uFillTx/>
+                <a:latin typeface="Calibri"/>
+                <a:ea typeface="+mn-ea"/>
+                <a:cs typeface="+mn-cs"/>
+              </a:rPr>
+              <a:t> + Vite</a:t>
+            </a:r>
+          </a:p>
+        </p:txBody>
+      </p:sp>
+      <p:sp>
+        <p:nvSpPr>
+          <p:cNvPr id="13" name="Retângulo: Cantos Arredondados 12">
+            <a:extLst>
+              <a:ext uri="{FF2B5EF4-FFF2-40B4-BE49-F238E27FC236}">
+                <a16:creationId xmlns:a16="http://schemas.microsoft.com/office/drawing/2014/main" id="{44FFB951-3C40-3866-DF5D-3CA00A57FD70}"/>
+              </a:ext>
+            </a:extLst>
+          </p:cNvPr>
+          <p:cNvSpPr/>
+          <p:nvPr/>
+        </p:nvSpPr>
+        <p:spPr>
+          <a:xfrm>
+            <a:off x="3953915" y="2709064"/>
+            <a:ext cx="1797050" cy="654050"/>
+          </a:xfrm>
+          <a:prstGeom prst="roundRect">
+            <a:avLst/>
+          </a:prstGeom>
+          <a:solidFill>
+            <a:srgbClr val="4BACC6">
+              <a:lumMod val="40000"/>
+              <a:lumOff val="60000"/>
+            </a:srgbClr>
+          </a:solidFill>
+          <a:ln>
+            <a:noFill/>
+          </a:ln>
+          <a:effectLst/>
+        </p:spPr>
+        <p:txBody>
+          <a:bodyPr rtlCol="0" anchor="ctr"/>
+          <a:lstStyle/>
+          <a:p>
+            <a:pPr marL="0" marR="0" lvl="0" indent="0" algn="ctr" defTabSz="457200" eaLnBrk="1" fontAlgn="auto" latinLnBrk="0" hangingPunct="1">
+              <a:lnSpc>
+                <a:spcPct val="100000"/>
+              </a:lnSpc>
+              <a:spcBef>
+                <a:spcPts val="0"/>
+              </a:spcBef>
+              <a:spcAft>
+                <a:spcPts val="0"/>
+              </a:spcAft>
+              <a:buClrTx/>
+              <a:buSzTx/>
+              <a:buFontTx/>
+              <a:buNone/>
+              <a:tabLst/>
+              <a:defRPr/>
+            </a:pPr>
+            <a:r>
+              <a:rPr kumimoji="0" lang="pt-BR" sz="1600" b="0" i="0" u="none" strike="noStrike" kern="0" cap="none" spc="0" normalizeH="0" baseline="0" noProof="0" dirty="0" err="1">
+                <a:ln>
+                  <a:noFill/>
+                </a:ln>
+                <a:solidFill>
+                  <a:prstClr val="black"/>
+                </a:solidFill>
+                <a:effectLst/>
+                <a:uLnTx/>
+                <a:uFillTx/>
+                <a:latin typeface="Calibri"/>
+                <a:ea typeface="+mn-ea"/>
+                <a:cs typeface="+mn-cs"/>
+              </a:rPr>
+              <a:t>Backend</a:t>
+            </a:r>
+            <a:endParaRPr kumimoji="0" lang="pt-BR" sz="1600" b="0" i="0" u="none" strike="noStrike" kern="0" cap="none" spc="0" normalizeH="0" baseline="0" noProof="0" dirty="0">
+              <a:ln>
+                <a:noFill/>
+              </a:ln>
+              <a:solidFill>
+                <a:prstClr val="black"/>
+              </a:solidFill>
+              <a:effectLst/>
+              <a:uLnTx/>
+              <a:uFillTx/>
+              <a:latin typeface="Calibri"/>
+              <a:ea typeface="+mn-ea"/>
+              <a:cs typeface="+mn-cs"/>
+            </a:endParaRPr>
+          </a:p>
+          <a:p>
+            <a:pPr marL="0" marR="0" lvl="0" indent="0" algn="ctr" defTabSz="457200" eaLnBrk="1" fontAlgn="auto" latinLnBrk="0" hangingPunct="1">
+              <a:lnSpc>
+                <a:spcPct val="100000"/>
+              </a:lnSpc>
+              <a:spcBef>
+                <a:spcPts val="0"/>
+              </a:spcBef>
+              <a:spcAft>
+                <a:spcPts val="0"/>
+              </a:spcAft>
+              <a:buClrTx/>
+              <a:buSzTx/>
+              <a:buFontTx/>
+              <a:buNone/>
+              <a:tabLst/>
+              <a:defRPr/>
+            </a:pPr>
+            <a:r>
+              <a:rPr kumimoji="0" lang="pt-BR" sz="1600" b="0" i="0" u="none" strike="noStrike" kern="0" cap="none" spc="0" normalizeH="0" baseline="0" noProof="0" dirty="0">
+                <a:ln>
+                  <a:noFill/>
+                </a:ln>
+                <a:solidFill>
+                  <a:srgbClr val="0070C0"/>
+                </a:solidFill>
+                <a:effectLst/>
+                <a:uLnTx/>
+                <a:uFillTx/>
+                <a:latin typeface="Calibri"/>
+                <a:ea typeface="+mn-ea"/>
+                <a:cs typeface="+mn-cs"/>
+              </a:rPr>
+              <a:t>Node.js + Express</a:t>
+            </a:r>
+          </a:p>
+        </p:txBody>
+      </p:sp>
+      <p:sp>
+        <p:nvSpPr>
+          <p:cNvPr id="14" name="Retângulo: Cantos Arredondados 13">
+            <a:extLst>
+              <a:ext uri="{FF2B5EF4-FFF2-40B4-BE49-F238E27FC236}">
+                <a16:creationId xmlns:a16="http://schemas.microsoft.com/office/drawing/2014/main" id="{C37B065A-DF25-EE48-C0FB-948B1DE08C0C}"/>
+              </a:ext>
+            </a:extLst>
+          </p:cNvPr>
+          <p:cNvSpPr/>
+          <p:nvPr/>
+        </p:nvSpPr>
+        <p:spPr>
+          <a:xfrm>
+            <a:off x="3953915" y="4222751"/>
+            <a:ext cx="1797050" cy="654050"/>
+          </a:xfrm>
+          <a:prstGeom prst="roundRect">
+            <a:avLst/>
+          </a:prstGeom>
+          <a:solidFill>
+            <a:srgbClr val="9BBB59">
+              <a:lumMod val="40000"/>
+              <a:lumOff val="60000"/>
+            </a:srgbClr>
+          </a:solidFill>
+          <a:ln>
+            <a:noFill/>
+          </a:ln>
+          <a:effectLst/>
+        </p:spPr>
+        <p:txBody>
+          <a:bodyPr rtlCol="0" anchor="ctr"/>
+          <a:lstStyle/>
+          <a:p>
+            <a:pPr marL="0" marR="0" lvl="0" indent="0" algn="ctr" defTabSz="457200" eaLnBrk="1" fontAlgn="auto" latinLnBrk="0" hangingPunct="1">
+              <a:lnSpc>
+                <a:spcPct val="100000"/>
+              </a:lnSpc>
+              <a:spcBef>
+                <a:spcPts val="0"/>
+              </a:spcBef>
+              <a:spcAft>
+                <a:spcPts val="0"/>
+              </a:spcAft>
+              <a:buClrTx/>
+              <a:buSzTx/>
+              <a:buFontTx/>
+              <a:buNone/>
+              <a:tabLst/>
+              <a:defRPr/>
+            </a:pPr>
+            <a:r>
+              <a:rPr kumimoji="0" lang="pt-BR" sz="1600" b="0" i="0" u="none" strike="noStrike" kern="0" cap="none" spc="0" normalizeH="0" baseline="0" noProof="0" dirty="0">
+                <a:ln>
+                  <a:noFill/>
+                </a:ln>
+                <a:solidFill>
+                  <a:prstClr val="black"/>
+                </a:solidFill>
+                <a:effectLst/>
+                <a:uLnTx/>
+                <a:uFillTx/>
+                <a:latin typeface="Calibri"/>
+                <a:ea typeface="+mn-ea"/>
+                <a:cs typeface="+mn-cs"/>
+              </a:rPr>
+              <a:t>Banco de Dados</a:t>
+            </a:r>
+          </a:p>
+          <a:p>
+            <a:pPr marL="0" marR="0" lvl="0" indent="0" algn="ctr" defTabSz="457200" eaLnBrk="1" fontAlgn="auto" latinLnBrk="0" hangingPunct="1">
+              <a:lnSpc>
+                <a:spcPct val="100000"/>
+              </a:lnSpc>
+              <a:spcBef>
+                <a:spcPts val="0"/>
+              </a:spcBef>
+              <a:spcAft>
+                <a:spcPts val="0"/>
+              </a:spcAft>
+              <a:buClrTx/>
+              <a:buSzTx/>
+              <a:buFontTx/>
+              <a:buNone/>
+              <a:tabLst/>
+              <a:defRPr/>
+            </a:pPr>
+            <a:r>
+              <a:rPr kumimoji="0" lang="pt-BR" sz="1600" b="0" i="0" u="none" strike="noStrike" kern="0" cap="none" spc="0" normalizeH="0" baseline="0" noProof="0" dirty="0">
+                <a:ln>
+                  <a:noFill/>
+                </a:ln>
+                <a:solidFill>
+                  <a:srgbClr val="00B050"/>
+                </a:solidFill>
+                <a:effectLst/>
+                <a:uLnTx/>
+                <a:uFillTx/>
+                <a:latin typeface="Calibri"/>
+                <a:ea typeface="+mn-ea"/>
+                <a:cs typeface="+mn-cs"/>
+              </a:rPr>
+              <a:t>PostgreSQL</a:t>
+            </a:r>
+          </a:p>
+        </p:txBody>
+      </p:sp>
+      <p:cxnSp>
+        <p:nvCxnSpPr>
+          <p:cNvPr id="15" name="Conector de Seta Reta 14">
+            <a:extLst>
+              <a:ext uri="{FF2B5EF4-FFF2-40B4-BE49-F238E27FC236}">
+                <a16:creationId xmlns:a16="http://schemas.microsoft.com/office/drawing/2014/main" id="{E240C6CC-03F3-6C1C-3251-7A4B7601A186}"/>
+              </a:ext>
+            </a:extLst>
+          </p:cNvPr>
+          <p:cNvCxnSpPr>
+            <a:cxnSpLocks/>
+            <a:stCxn id="12" idx="2"/>
+            <a:endCxn id="13" idx="0"/>
+          </p:cNvCxnSpPr>
+          <p:nvPr/>
+        </p:nvCxnSpPr>
+        <p:spPr>
+          <a:xfrm>
+            <a:off x="4852440" y="1581286"/>
+            <a:ext cx="0" cy="1127778"/>
+          </a:xfrm>
+          <a:prstGeom prst="straightConnector1">
+            <a:avLst/>
+          </a:prstGeom>
+          <a:noFill/>
+          <a:ln w="19050" cap="flat" cmpd="sng" algn="ctr">
+            <a:solidFill>
+              <a:sysClr val="windowText" lastClr="000000"/>
+            </a:solidFill>
+            <a:prstDash val="solid"/>
+            <a:round/>
+            <a:headEnd type="none" w="med" len="med"/>
+            <a:tailEnd type="arrow" w="med" len="med"/>
+          </a:ln>
+          <a:effectLst/>
+        </p:spPr>
+      </p:cxnSp>
+      <p:cxnSp>
+        <p:nvCxnSpPr>
+          <p:cNvPr id="28" name="Conector de Seta Reta 27">
+            <a:extLst>
+              <a:ext uri="{FF2B5EF4-FFF2-40B4-BE49-F238E27FC236}">
+                <a16:creationId xmlns:a16="http://schemas.microsoft.com/office/drawing/2014/main" id="{F72701E8-4CC8-A725-AD56-129EB3D615A2}"/>
+              </a:ext>
+            </a:extLst>
+          </p:cNvPr>
+          <p:cNvCxnSpPr>
+            <a:cxnSpLocks/>
+            <a:stCxn id="13" idx="2"/>
+            <a:endCxn id="14" idx="0"/>
+          </p:cNvCxnSpPr>
+          <p:nvPr/>
+        </p:nvCxnSpPr>
+        <p:spPr>
+          <a:xfrm>
+            <a:off x="4852440" y="3363114"/>
+            <a:ext cx="0" cy="859637"/>
+          </a:xfrm>
+          <a:prstGeom prst="straightConnector1">
+            <a:avLst/>
+          </a:prstGeom>
+          <a:noFill/>
+          <a:ln w="19050" cap="flat" cmpd="sng" algn="ctr">
+            <a:solidFill>
+              <a:sysClr val="windowText" lastClr="000000"/>
+            </a:solidFill>
+            <a:prstDash val="solid"/>
+            <a:round/>
+            <a:headEnd type="none" w="med" len="med"/>
+            <a:tailEnd type="arrow" w="med" len="med"/>
+          </a:ln>
+          <a:effectLst/>
+        </p:spPr>
+      </p:cxnSp>
+      <p:sp>
+        <p:nvSpPr>
+          <p:cNvPr id="29" name="Chave Esquerda 28">
+            <a:extLst>
+              <a:ext uri="{FF2B5EF4-FFF2-40B4-BE49-F238E27FC236}">
+                <a16:creationId xmlns:a16="http://schemas.microsoft.com/office/drawing/2014/main" id="{BED503D7-FE6B-50B6-4CE0-BE20F34547CB}"/>
+              </a:ext>
+            </a:extLst>
+          </p:cNvPr>
+          <p:cNvSpPr/>
+          <p:nvPr/>
+        </p:nvSpPr>
+        <p:spPr>
+          <a:xfrm rot="16200000">
+            <a:off x="1907460" y="4648938"/>
+            <a:ext cx="234295" cy="1998118"/>
+          </a:xfrm>
+          <a:prstGeom prst="leftBrace">
+            <a:avLst/>
+          </a:prstGeom>
+        </p:spPr>
+        <p:style>
+          <a:lnRef idx="2">
+            <a:schemeClr val="dk1"/>
+          </a:lnRef>
+          <a:fillRef idx="0">
+            <a:schemeClr val="dk1"/>
+          </a:fillRef>
+          <a:effectRef idx="1">
+            <a:schemeClr val="dk1"/>
+          </a:effectRef>
+          <a:fontRef idx="minor">
+            <a:schemeClr val="tx1"/>
+          </a:fontRef>
+        </p:style>
+        <p:txBody>
+          <a:bodyPr rtlCol="0" anchor="ctr"/>
+          <a:lstStyle/>
+          <a:p>
+            <a:pPr algn="ctr"/>
+            <a:endParaRPr lang="pt-BR"/>
+          </a:p>
+        </p:txBody>
+      </p:sp>
+      <p:sp>
+        <p:nvSpPr>
+          <p:cNvPr id="31" name="CaixaDeTexto 30">
+            <a:extLst>
+              <a:ext uri="{FF2B5EF4-FFF2-40B4-BE49-F238E27FC236}">
+                <a16:creationId xmlns:a16="http://schemas.microsoft.com/office/drawing/2014/main" id="{37531C0C-F536-B9E9-1DA4-04F6A0C601FF}"/>
+              </a:ext>
+            </a:extLst>
+          </p:cNvPr>
+          <p:cNvSpPr txBox="1"/>
+          <p:nvPr/>
+        </p:nvSpPr>
+        <p:spPr>
+          <a:xfrm>
+            <a:off x="1025548" y="5881969"/>
+            <a:ext cx="1949448" cy="369332"/>
+          </a:xfrm>
+          <a:prstGeom prst="rect">
+            <a:avLst/>
+          </a:prstGeom>
+          <a:noFill/>
+        </p:spPr>
+        <p:txBody>
+          <a:bodyPr wrap="square">
+            <a:spAutoFit/>
+          </a:bodyPr>
+          <a:lstStyle/>
+          <a:p>
+            <a:pPr algn="ctr"/>
+            <a:r>
+              <a:rPr lang="pt-BR" dirty="0">
+                <a:solidFill>
+                  <a:schemeClr val="tx1">
+                    <a:lumMod val="50000"/>
+                    <a:lumOff val="50000"/>
+                  </a:schemeClr>
+                </a:solidFill>
+              </a:rPr>
+              <a:t>Contexto</a:t>
+            </a:r>
+          </a:p>
+        </p:txBody>
+      </p:sp>
+      <p:sp>
+        <p:nvSpPr>
+          <p:cNvPr id="32" name="Chave Esquerda 31">
+            <a:extLst>
+              <a:ext uri="{FF2B5EF4-FFF2-40B4-BE49-F238E27FC236}">
+                <a16:creationId xmlns:a16="http://schemas.microsoft.com/office/drawing/2014/main" id="{568B5C65-B6EE-5FD0-D48B-56529C507EB3}"/>
+              </a:ext>
+            </a:extLst>
+          </p:cNvPr>
+          <p:cNvSpPr/>
+          <p:nvPr/>
+        </p:nvSpPr>
+        <p:spPr>
+          <a:xfrm rot="16200000">
+            <a:off x="4722585" y="4648940"/>
+            <a:ext cx="234295" cy="1998118"/>
+          </a:xfrm>
+          <a:prstGeom prst="leftBrace">
+            <a:avLst/>
+          </a:prstGeom>
+        </p:spPr>
+        <p:style>
+          <a:lnRef idx="2">
+            <a:schemeClr val="dk1"/>
+          </a:lnRef>
+          <a:fillRef idx="0">
+            <a:schemeClr val="dk1"/>
+          </a:fillRef>
+          <a:effectRef idx="1">
+            <a:schemeClr val="dk1"/>
+          </a:effectRef>
+          <a:fontRef idx="minor">
+            <a:schemeClr val="tx1"/>
+          </a:fontRef>
+        </p:style>
+        <p:txBody>
+          <a:bodyPr rtlCol="0" anchor="ctr"/>
+          <a:lstStyle/>
+          <a:p>
+            <a:pPr algn="ctr"/>
+            <a:endParaRPr lang="pt-BR"/>
+          </a:p>
+        </p:txBody>
+      </p:sp>
+      <p:sp>
+        <p:nvSpPr>
+          <p:cNvPr id="33" name="CaixaDeTexto 32">
+            <a:extLst>
+              <a:ext uri="{FF2B5EF4-FFF2-40B4-BE49-F238E27FC236}">
+                <a16:creationId xmlns:a16="http://schemas.microsoft.com/office/drawing/2014/main" id="{B07AA680-FFFF-1FE7-3B9D-3EA4CEF5DEA1}"/>
+              </a:ext>
+            </a:extLst>
+          </p:cNvPr>
+          <p:cNvSpPr txBox="1"/>
+          <p:nvPr/>
+        </p:nvSpPr>
+        <p:spPr>
+          <a:xfrm>
+            <a:off x="3840673" y="5881971"/>
+            <a:ext cx="1949448" cy="369332"/>
+          </a:xfrm>
+          <a:prstGeom prst="rect">
+            <a:avLst/>
+          </a:prstGeom>
+          <a:noFill/>
+        </p:spPr>
+        <p:txBody>
+          <a:bodyPr wrap="square">
+            <a:spAutoFit/>
+          </a:bodyPr>
+          <a:lstStyle/>
+          <a:p>
+            <a:pPr algn="ctr"/>
+            <a:r>
+              <a:rPr lang="pt-BR" dirty="0">
+                <a:solidFill>
+                  <a:schemeClr val="tx1">
+                    <a:lumMod val="50000"/>
+                    <a:lumOff val="50000"/>
+                  </a:schemeClr>
+                </a:solidFill>
+              </a:rPr>
+              <a:t>Containers</a:t>
+            </a:r>
+          </a:p>
+        </p:txBody>
+      </p:sp>
+      <p:sp>
+        <p:nvSpPr>
+          <p:cNvPr id="34" name="Chave Esquerda 33">
+            <a:extLst>
+              <a:ext uri="{FF2B5EF4-FFF2-40B4-BE49-F238E27FC236}">
+                <a16:creationId xmlns:a16="http://schemas.microsoft.com/office/drawing/2014/main" id="{403BD0A4-A77F-2D30-F4DF-8827E92BB937}"/>
+              </a:ext>
+            </a:extLst>
+          </p:cNvPr>
+          <p:cNvSpPr/>
+          <p:nvPr/>
+        </p:nvSpPr>
+        <p:spPr>
+          <a:xfrm rot="16200000">
+            <a:off x="7860559" y="4648938"/>
+            <a:ext cx="234295" cy="1998118"/>
+          </a:xfrm>
+          <a:prstGeom prst="leftBrace">
+            <a:avLst/>
+          </a:prstGeom>
+        </p:spPr>
+        <p:style>
+          <a:lnRef idx="2">
+            <a:schemeClr val="dk1"/>
+          </a:lnRef>
+          <a:fillRef idx="0">
+            <a:schemeClr val="dk1"/>
+          </a:fillRef>
+          <a:effectRef idx="1">
+            <a:schemeClr val="dk1"/>
+          </a:effectRef>
+          <a:fontRef idx="minor">
+            <a:schemeClr val="tx1"/>
+          </a:fontRef>
+        </p:style>
+        <p:txBody>
+          <a:bodyPr rtlCol="0" anchor="ctr"/>
+          <a:lstStyle/>
+          <a:p>
+            <a:pPr algn="ctr"/>
+            <a:endParaRPr lang="pt-BR"/>
+          </a:p>
+        </p:txBody>
+      </p:sp>
+      <p:sp>
+        <p:nvSpPr>
+          <p:cNvPr id="35" name="CaixaDeTexto 34">
+            <a:extLst>
+              <a:ext uri="{FF2B5EF4-FFF2-40B4-BE49-F238E27FC236}">
+                <a16:creationId xmlns:a16="http://schemas.microsoft.com/office/drawing/2014/main" id="{09B29CA6-3B0A-75E8-24D0-F938884981FE}"/>
+              </a:ext>
+            </a:extLst>
+          </p:cNvPr>
+          <p:cNvSpPr txBox="1"/>
+          <p:nvPr/>
+        </p:nvSpPr>
+        <p:spPr>
+          <a:xfrm>
+            <a:off x="6978647" y="5881969"/>
+            <a:ext cx="1949448" cy="369332"/>
+          </a:xfrm>
+          <a:prstGeom prst="rect">
+            <a:avLst/>
+          </a:prstGeom>
+          <a:noFill/>
+        </p:spPr>
+        <p:txBody>
+          <a:bodyPr wrap="square">
+            <a:spAutoFit/>
+          </a:bodyPr>
+          <a:lstStyle/>
+          <a:p>
+            <a:pPr algn="ctr"/>
+            <a:r>
+              <a:rPr lang="pt-BR" dirty="0">
+                <a:solidFill>
+                  <a:schemeClr val="tx1">
+                    <a:lumMod val="50000"/>
+                    <a:lumOff val="50000"/>
+                  </a:schemeClr>
+                </a:solidFill>
+              </a:rPr>
+              <a:t>Componentes</a:t>
+            </a:r>
+          </a:p>
+        </p:txBody>
+      </p:sp>
+      <p:sp>
+        <p:nvSpPr>
+          <p:cNvPr id="36" name="Chave Esquerda 35">
+            <a:extLst>
+              <a:ext uri="{FF2B5EF4-FFF2-40B4-BE49-F238E27FC236}">
+                <a16:creationId xmlns:a16="http://schemas.microsoft.com/office/drawing/2014/main" id="{26B67341-3028-52B7-685C-23A34EFE06D1}"/>
+              </a:ext>
+            </a:extLst>
+          </p:cNvPr>
+          <p:cNvSpPr/>
+          <p:nvPr/>
+        </p:nvSpPr>
+        <p:spPr>
+          <a:xfrm>
+            <a:off x="6196536" y="737457"/>
+            <a:ext cx="380997" cy="887739"/>
+          </a:xfrm>
+          <a:prstGeom prst="leftBrace">
+            <a:avLst/>
+          </a:prstGeom>
+        </p:spPr>
+        <p:style>
+          <a:lnRef idx="2">
+            <a:schemeClr val="dk1"/>
+          </a:lnRef>
+          <a:fillRef idx="0">
+            <a:schemeClr val="dk1"/>
+          </a:fillRef>
+          <a:effectRef idx="1">
+            <a:schemeClr val="dk1"/>
+          </a:effectRef>
+          <a:fontRef idx="minor">
+            <a:schemeClr val="tx1"/>
+          </a:fontRef>
+        </p:style>
+        <p:txBody>
+          <a:bodyPr rtlCol="0" anchor="ctr"/>
+          <a:lstStyle/>
+          <a:p>
+            <a:pPr algn="ctr"/>
+            <a:endParaRPr lang="pt-BR"/>
+          </a:p>
+        </p:txBody>
+      </p:sp>
+      <p:sp>
+        <p:nvSpPr>
+          <p:cNvPr id="41" name="Chave Esquerda 40">
+            <a:extLst>
+              <a:ext uri="{FF2B5EF4-FFF2-40B4-BE49-F238E27FC236}">
+                <a16:creationId xmlns:a16="http://schemas.microsoft.com/office/drawing/2014/main" id="{77C9BCDA-D195-774F-0A2A-E22CE2549DCC}"/>
+              </a:ext>
+            </a:extLst>
+          </p:cNvPr>
+          <p:cNvSpPr/>
+          <p:nvPr/>
+        </p:nvSpPr>
+        <p:spPr>
+          <a:xfrm>
+            <a:off x="6196536" y="2189019"/>
+            <a:ext cx="380997" cy="1775478"/>
+          </a:xfrm>
+          <a:prstGeom prst="leftBrace">
+            <a:avLst/>
+          </a:prstGeom>
+        </p:spPr>
+        <p:style>
+          <a:lnRef idx="2">
+            <a:schemeClr val="dk1"/>
+          </a:lnRef>
+          <a:fillRef idx="0">
+            <a:schemeClr val="dk1"/>
+          </a:fillRef>
+          <a:effectRef idx="1">
+            <a:schemeClr val="dk1"/>
+          </a:effectRef>
+          <a:fontRef idx="minor">
+            <a:schemeClr val="tx1"/>
+          </a:fontRef>
+        </p:style>
+        <p:txBody>
+          <a:bodyPr rtlCol="0" anchor="ctr"/>
+          <a:lstStyle/>
+          <a:p>
+            <a:pPr algn="ctr"/>
+            <a:endParaRPr lang="pt-BR"/>
+          </a:p>
+        </p:txBody>
+      </p:sp>
+      <p:sp>
+        <p:nvSpPr>
+          <p:cNvPr id="42" name="Retângulo: Cantos Arredondados 41">
+            <a:extLst>
+              <a:ext uri="{FF2B5EF4-FFF2-40B4-BE49-F238E27FC236}">
+                <a16:creationId xmlns:a16="http://schemas.microsoft.com/office/drawing/2014/main" id="{FCBF84CF-DD70-FD94-0856-1522939C4A3A}"/>
+              </a:ext>
+            </a:extLst>
+          </p:cNvPr>
+          <p:cNvSpPr/>
+          <p:nvPr/>
+        </p:nvSpPr>
+        <p:spPr>
+          <a:xfrm>
+            <a:off x="7131045" y="712528"/>
+            <a:ext cx="1797050" cy="336213"/>
+          </a:xfrm>
+          <a:prstGeom prst="roundRect">
+            <a:avLst/>
+          </a:prstGeom>
+          <a:solidFill>
+            <a:srgbClr val="C0504D">
+              <a:lumMod val="40000"/>
+              <a:lumOff val="60000"/>
+            </a:srgbClr>
+          </a:solidFill>
+          <a:ln>
+            <a:noFill/>
+          </a:ln>
+          <a:effectLst/>
+        </p:spPr>
+        <p:txBody>
+          <a:bodyPr rtlCol="0" anchor="ctr"/>
+          <a:lstStyle/>
+          <a:p>
+            <a:pPr marL="0" marR="0" lvl="0" indent="0" algn="ctr" defTabSz="457200" eaLnBrk="1" fontAlgn="auto" latinLnBrk="0" hangingPunct="1">
+              <a:lnSpc>
+                <a:spcPct val="100000"/>
+              </a:lnSpc>
+              <a:spcBef>
+                <a:spcPts val="0"/>
+              </a:spcBef>
+              <a:spcAft>
+                <a:spcPts val="0"/>
+              </a:spcAft>
+              <a:buClrTx/>
+              <a:buSzTx/>
+              <a:buFontTx/>
+              <a:buNone/>
+              <a:tabLst/>
+              <a:defRPr/>
+            </a:pPr>
+            <a:r>
+              <a:rPr kumimoji="0" lang="pt-BR" sz="1600" b="0" i="0" u="none" strike="noStrike" kern="0" cap="none" spc="0" normalizeH="0" baseline="0" noProof="0" dirty="0" err="1">
+                <a:ln>
+                  <a:noFill/>
+                </a:ln>
+                <a:solidFill>
+                  <a:prstClr val="black"/>
+                </a:solidFill>
+                <a:effectLst/>
+                <a:uLnTx/>
+                <a:uFillTx/>
+                <a:latin typeface="Calibri"/>
+                <a:ea typeface="+mn-ea"/>
+                <a:cs typeface="+mn-cs"/>
+              </a:rPr>
+              <a:t>LoginPage.jsx</a:t>
+            </a:r>
+            <a:endParaRPr kumimoji="0" lang="pt-BR" sz="1600" b="0" i="0" u="none" strike="noStrike" kern="0" cap="none" spc="0" normalizeH="0" baseline="0" noProof="0" dirty="0">
+              <a:ln>
+                <a:noFill/>
+              </a:ln>
+              <a:solidFill>
+                <a:srgbClr val="FF0000"/>
+              </a:solidFill>
+              <a:effectLst/>
+              <a:uLnTx/>
+              <a:uFillTx/>
+              <a:latin typeface="Calibri"/>
+              <a:ea typeface="+mn-ea"/>
+              <a:cs typeface="+mn-cs"/>
+            </a:endParaRPr>
+          </a:p>
+        </p:txBody>
+      </p:sp>
+      <p:sp>
+        <p:nvSpPr>
+          <p:cNvPr id="43" name="Retângulo: Cantos Arredondados 42">
+            <a:extLst>
+              <a:ext uri="{FF2B5EF4-FFF2-40B4-BE49-F238E27FC236}">
+                <a16:creationId xmlns:a16="http://schemas.microsoft.com/office/drawing/2014/main" id="{A9FC158A-D398-AC8E-F748-C96E756BA4F4}"/>
+              </a:ext>
+            </a:extLst>
+          </p:cNvPr>
+          <p:cNvSpPr/>
+          <p:nvPr/>
+        </p:nvSpPr>
+        <p:spPr>
+          <a:xfrm>
+            <a:off x="7131045" y="1264054"/>
+            <a:ext cx="1797050" cy="336213"/>
+          </a:xfrm>
+          <a:prstGeom prst="roundRect">
+            <a:avLst/>
+          </a:prstGeom>
+          <a:solidFill>
+            <a:srgbClr val="C0504D">
+              <a:lumMod val="40000"/>
+              <a:lumOff val="60000"/>
+            </a:srgbClr>
+          </a:solidFill>
+          <a:ln>
+            <a:noFill/>
+          </a:ln>
+          <a:effectLst/>
+        </p:spPr>
+        <p:txBody>
+          <a:bodyPr rtlCol="0" anchor="ctr"/>
+          <a:lstStyle/>
+          <a:p>
+            <a:pPr lvl="0" algn="ctr" defTabSz="457200">
+              <a:defRPr/>
+            </a:pPr>
+            <a:r>
+              <a:rPr lang="pt-BR" sz="1600" kern="0" dirty="0" err="1">
+                <a:solidFill>
+                  <a:prstClr val="black"/>
+                </a:solidFill>
+                <a:latin typeface="Calibri"/>
+              </a:rPr>
+              <a:t>HomePage</a:t>
+            </a:r>
+            <a:r>
+              <a:rPr lang="pt-BR" sz="1600" kern="0" dirty="0">
+                <a:solidFill>
+                  <a:prstClr val="black"/>
+                </a:solidFill>
+                <a:latin typeface="Calibri"/>
+              </a:rPr>
+              <a:t> .</a:t>
+            </a:r>
+            <a:r>
+              <a:rPr lang="pt-BR" sz="1600" kern="0" dirty="0" err="1">
+                <a:solidFill>
+                  <a:prstClr val="black"/>
+                </a:solidFill>
+                <a:latin typeface="Calibri"/>
+              </a:rPr>
+              <a:t>jsx</a:t>
+            </a:r>
+            <a:endParaRPr kumimoji="0" lang="pt-BR" sz="1600" b="0" i="0" u="none" strike="noStrike" kern="0" cap="none" spc="0" normalizeH="0" baseline="0" noProof="0" dirty="0">
+              <a:ln>
+                <a:noFill/>
+              </a:ln>
+              <a:solidFill>
+                <a:srgbClr val="FF0000"/>
+              </a:solidFill>
+              <a:effectLst/>
+              <a:uLnTx/>
+              <a:uFillTx/>
+              <a:latin typeface="Calibri"/>
+              <a:ea typeface="+mn-ea"/>
+              <a:cs typeface="+mn-cs"/>
+            </a:endParaRPr>
+          </a:p>
+        </p:txBody>
+      </p:sp>
+      <p:sp>
+        <p:nvSpPr>
+          <p:cNvPr id="44" name="Retângulo: Cantos Arredondados 43">
+            <a:extLst>
+              <a:ext uri="{FF2B5EF4-FFF2-40B4-BE49-F238E27FC236}">
+                <a16:creationId xmlns:a16="http://schemas.microsoft.com/office/drawing/2014/main" id="{7C5199C2-6E4E-0B4D-9C80-C85493495454}"/>
+              </a:ext>
+            </a:extLst>
+          </p:cNvPr>
+          <p:cNvSpPr/>
+          <p:nvPr/>
+        </p:nvSpPr>
+        <p:spPr>
+          <a:xfrm>
+            <a:off x="7022008" y="2867982"/>
+            <a:ext cx="1936755" cy="336213"/>
+          </a:xfrm>
+          <a:prstGeom prst="roundRect">
+            <a:avLst/>
+          </a:prstGeom>
+          <a:solidFill>
+            <a:srgbClr val="4BACC6">
+              <a:lumMod val="40000"/>
+              <a:lumOff val="60000"/>
+            </a:srgbClr>
+          </a:solidFill>
+          <a:ln>
+            <a:noFill/>
+          </a:ln>
+          <a:effectLst/>
+        </p:spPr>
+        <p:txBody>
+          <a:bodyPr rtlCol="0" anchor="ctr"/>
+          <a:lstStyle/>
+          <a:p>
+            <a:pPr marL="0" marR="0" lvl="0" indent="0" algn="ctr" defTabSz="457200" eaLnBrk="1" fontAlgn="auto" latinLnBrk="0" hangingPunct="1">
+              <a:lnSpc>
+                <a:spcPct val="100000"/>
+              </a:lnSpc>
+              <a:spcBef>
+                <a:spcPts val="0"/>
+              </a:spcBef>
+              <a:spcAft>
+                <a:spcPts val="0"/>
+              </a:spcAft>
+              <a:buClrTx/>
+              <a:buSzTx/>
+              <a:buFontTx/>
+              <a:buNone/>
+              <a:tabLst/>
+              <a:defRPr/>
+            </a:pPr>
+            <a:r>
+              <a:rPr kumimoji="0" lang="pt-BR" sz="1600" b="0" i="0" u="none" strike="noStrike" kern="0" cap="none" spc="0" normalizeH="0" baseline="0" noProof="0" dirty="0" err="1">
+                <a:ln>
+                  <a:noFill/>
+                </a:ln>
+                <a:solidFill>
+                  <a:prstClr val="black"/>
+                </a:solidFill>
+                <a:effectLst/>
+                <a:uLnTx/>
+                <a:uFillTx/>
+                <a:latin typeface="Calibri"/>
+                <a:ea typeface="+mn-ea"/>
+                <a:cs typeface="+mn-cs"/>
+              </a:rPr>
+              <a:t>Controllers</a:t>
+            </a:r>
+            <a:r>
+              <a:rPr kumimoji="0" lang="pt-BR" sz="1600" b="0" i="0" u="none" strike="noStrike" kern="0" cap="none" spc="0" normalizeH="0" baseline="0" noProof="0" dirty="0">
+                <a:ln>
+                  <a:noFill/>
+                </a:ln>
+                <a:solidFill>
+                  <a:prstClr val="black"/>
+                </a:solidFill>
+                <a:effectLst/>
+                <a:uLnTx/>
+                <a:uFillTx/>
+                <a:latin typeface="Calibri"/>
+                <a:ea typeface="+mn-ea"/>
+                <a:cs typeface="+mn-cs"/>
+              </a:rPr>
+              <a:t> (index.js)</a:t>
+            </a:r>
+          </a:p>
+        </p:txBody>
+      </p:sp>
+      <p:sp>
+        <p:nvSpPr>
+          <p:cNvPr id="45" name="Retângulo: Cantos Arredondados 44">
+            <a:extLst>
+              <a:ext uri="{FF2B5EF4-FFF2-40B4-BE49-F238E27FC236}">
+                <a16:creationId xmlns:a16="http://schemas.microsoft.com/office/drawing/2014/main" id="{56B355B4-F3BD-2C7D-5467-91E88C21B6F1}"/>
+              </a:ext>
+            </a:extLst>
+          </p:cNvPr>
+          <p:cNvSpPr/>
+          <p:nvPr/>
+        </p:nvSpPr>
+        <p:spPr>
+          <a:xfrm>
+            <a:off x="7022009" y="2189019"/>
+            <a:ext cx="1936754" cy="336213"/>
+          </a:xfrm>
+          <a:prstGeom prst="roundRect">
+            <a:avLst/>
+          </a:prstGeom>
+          <a:solidFill>
+            <a:srgbClr val="4BACC6">
+              <a:lumMod val="40000"/>
+              <a:lumOff val="60000"/>
+            </a:srgbClr>
+          </a:solidFill>
+          <a:ln>
+            <a:noFill/>
+          </a:ln>
+          <a:effectLst/>
+        </p:spPr>
+        <p:txBody>
+          <a:bodyPr rtlCol="0" anchor="ctr"/>
+          <a:lstStyle/>
+          <a:p>
+            <a:pPr lvl="0" algn="ctr" defTabSz="457200">
+              <a:defRPr/>
+            </a:pPr>
+            <a:r>
+              <a:rPr lang="pt-BR" sz="1600" dirty="0" err="1"/>
+              <a:t>Router</a:t>
+            </a:r>
+            <a:r>
+              <a:rPr lang="pt-BR" sz="1600" dirty="0"/>
+              <a:t> (</a:t>
+            </a:r>
+            <a:r>
+              <a:rPr lang="pt-BR" sz="1600" dirty="0" err="1"/>
+              <a:t>express</a:t>
+            </a:r>
+            <a:r>
+              <a:rPr lang="pt-BR" sz="1600" dirty="0"/>
+              <a:t>)</a:t>
+            </a:r>
+            <a:endParaRPr kumimoji="0" lang="pt-BR" sz="1600" b="0" i="0" u="none" strike="noStrike" kern="0" cap="none" spc="0" normalizeH="0" baseline="0" noProof="0" dirty="0">
+              <a:ln>
+                <a:noFill/>
+              </a:ln>
+              <a:solidFill>
+                <a:prstClr val="black"/>
+              </a:solidFill>
+              <a:effectLst/>
+              <a:uLnTx/>
+              <a:uFillTx/>
+              <a:latin typeface="Calibri"/>
+              <a:ea typeface="+mn-ea"/>
+              <a:cs typeface="+mn-cs"/>
+            </a:endParaRPr>
+          </a:p>
+        </p:txBody>
+      </p:sp>
+      <p:sp>
+        <p:nvSpPr>
+          <p:cNvPr id="46" name="Retângulo: Cantos Arredondados 45">
+            <a:extLst>
+              <a:ext uri="{FF2B5EF4-FFF2-40B4-BE49-F238E27FC236}">
+                <a16:creationId xmlns:a16="http://schemas.microsoft.com/office/drawing/2014/main" id="{17C7BC6A-038B-97AE-4689-0873A20CC7CD}"/>
+              </a:ext>
+            </a:extLst>
+          </p:cNvPr>
+          <p:cNvSpPr/>
+          <p:nvPr/>
+        </p:nvSpPr>
+        <p:spPr>
+          <a:xfrm>
+            <a:off x="7022008" y="3546945"/>
+            <a:ext cx="1936755" cy="336213"/>
+          </a:xfrm>
+          <a:prstGeom prst="roundRect">
+            <a:avLst/>
+          </a:prstGeom>
+          <a:solidFill>
+            <a:srgbClr val="4BACC6">
+              <a:lumMod val="40000"/>
+              <a:lumOff val="60000"/>
+            </a:srgbClr>
+          </a:solidFill>
+          <a:ln>
+            <a:noFill/>
+          </a:ln>
+          <a:effectLst/>
+        </p:spPr>
+        <p:txBody>
+          <a:bodyPr rtlCol="0" anchor="ctr"/>
+          <a:lstStyle/>
+          <a:p>
+            <a:pPr marL="0" marR="0" lvl="0" indent="0" algn="ctr" defTabSz="457200" eaLnBrk="1" fontAlgn="auto" latinLnBrk="0" hangingPunct="1">
+              <a:lnSpc>
+                <a:spcPct val="100000"/>
+              </a:lnSpc>
+              <a:spcBef>
+                <a:spcPts val="0"/>
+              </a:spcBef>
+              <a:spcAft>
+                <a:spcPts val="0"/>
+              </a:spcAft>
+              <a:buClrTx/>
+              <a:buSzTx/>
+              <a:buFontTx/>
+              <a:buNone/>
+              <a:tabLst/>
+              <a:defRPr/>
+            </a:pPr>
+            <a:r>
+              <a:rPr kumimoji="0" lang="pt-BR" sz="1600" b="0" i="0" u="none" strike="noStrike" kern="0" cap="none" spc="0" normalizeH="0" baseline="0" noProof="0" dirty="0" err="1">
+                <a:ln>
+                  <a:noFill/>
+                </a:ln>
+                <a:solidFill>
+                  <a:prstClr val="black"/>
+                </a:solidFill>
+                <a:effectLst/>
+                <a:uLnTx/>
+                <a:uFillTx/>
+                <a:latin typeface="Calibri"/>
+                <a:ea typeface="+mn-ea"/>
+                <a:cs typeface="+mn-cs"/>
+              </a:rPr>
+              <a:t>Repository</a:t>
+            </a:r>
+            <a:r>
+              <a:rPr kumimoji="0" lang="pt-BR" sz="1600" b="0" i="0" u="none" strike="noStrike" kern="0" cap="none" spc="0" normalizeH="0" baseline="0" noProof="0" dirty="0">
+                <a:ln>
+                  <a:noFill/>
+                </a:ln>
+                <a:solidFill>
+                  <a:prstClr val="black"/>
+                </a:solidFill>
+                <a:effectLst/>
+                <a:uLnTx/>
+                <a:uFillTx/>
+                <a:latin typeface="Calibri"/>
+                <a:ea typeface="+mn-ea"/>
+                <a:cs typeface="+mn-cs"/>
+              </a:rPr>
+              <a:t> (</a:t>
+            </a:r>
+            <a:r>
+              <a:rPr kumimoji="0" lang="pt-BR" sz="1600" b="0" i="0" u="none" strike="noStrike" kern="0" cap="none" spc="0" normalizeH="0" baseline="0" noProof="0" dirty="0" err="1">
+                <a:ln>
+                  <a:noFill/>
+                </a:ln>
+                <a:solidFill>
+                  <a:prstClr val="black"/>
+                </a:solidFill>
+                <a:effectLst/>
+                <a:uLnTx/>
+                <a:uFillTx/>
+                <a:latin typeface="Calibri"/>
+                <a:ea typeface="+mn-ea"/>
+                <a:cs typeface="+mn-cs"/>
+              </a:rPr>
+              <a:t>pg</a:t>
+            </a:r>
+            <a:r>
+              <a:rPr kumimoji="0" lang="pt-BR" sz="1600" b="0" i="0" u="none" strike="noStrike" kern="0" cap="none" spc="0" normalizeH="0" baseline="0" noProof="0" dirty="0">
+                <a:ln>
+                  <a:noFill/>
+                </a:ln>
+                <a:solidFill>
+                  <a:prstClr val="black"/>
+                </a:solidFill>
+                <a:effectLst/>
+                <a:uLnTx/>
+                <a:uFillTx/>
+                <a:latin typeface="Calibri"/>
+                <a:ea typeface="+mn-ea"/>
+                <a:cs typeface="+mn-cs"/>
+              </a:rPr>
+              <a:t>)</a:t>
+            </a:r>
+          </a:p>
+        </p:txBody>
+      </p:sp>
+    </p:spTree>
+    <p:extLst>
+      <p:ext uri="{BB962C8B-B14F-4D97-AF65-F5344CB8AC3E}">
+        <p14:creationId xmlns:p14="http://schemas.microsoft.com/office/powerpoint/2010/main" val="3450516063"/>
       </p:ext>
     </p:extLst>
   </p:cSld>

</xml_diff>